<commit_message>
+ added loadReplay diagram to presentation
</commit_message>
<xml_diff>
--- a/organisation/sc2010_final.pptx
+++ b/organisation/sc2010_final.pptx
@@ -5,7 +5,7 @@
     <p:sldMasterId id="2147483648" r:id="rId1"/>
   </p:sldMasterIdLst>
   <p:notesMasterIdLst>
-    <p:notesMasterId r:id="rId52"/>
+    <p:notesMasterId r:id="rId53"/>
   </p:notesMasterIdLst>
   <p:sldIdLst>
     <p:sldId id="258" r:id="rId2"/>
@@ -20,44 +20,45 @@
     <p:sldId id="262" r:id="rId11"/>
     <p:sldId id="272" r:id="rId12"/>
     <p:sldId id="263" r:id="rId13"/>
-    <p:sldId id="295" r:id="rId14"/>
-    <p:sldId id="269" r:id="rId15"/>
-    <p:sldId id="305" r:id="rId16"/>
-    <p:sldId id="304" r:id="rId17"/>
-    <p:sldId id="300" r:id="rId18"/>
-    <p:sldId id="296" r:id="rId19"/>
-    <p:sldId id="267" r:id="rId20"/>
-    <p:sldId id="266" r:id="rId21"/>
-    <p:sldId id="270" r:id="rId22"/>
-    <p:sldId id="289" r:id="rId23"/>
-    <p:sldId id="291" r:id="rId24"/>
-    <p:sldId id="298" r:id="rId25"/>
-    <p:sldId id="271" r:id="rId26"/>
-    <p:sldId id="297" r:id="rId27"/>
-    <p:sldId id="299" r:id="rId28"/>
-    <p:sldId id="290" r:id="rId29"/>
-    <p:sldId id="273" r:id="rId30"/>
-    <p:sldId id="277" r:id="rId31"/>
-    <p:sldId id="287" r:id="rId32"/>
-    <p:sldId id="278" r:id="rId33"/>
-    <p:sldId id="279" r:id="rId34"/>
-    <p:sldId id="276" r:id="rId35"/>
-    <p:sldId id="294" r:id="rId36"/>
-    <p:sldId id="286" r:id="rId37"/>
-    <p:sldId id="282" r:id="rId38"/>
-    <p:sldId id="306" r:id="rId39"/>
-    <p:sldId id="302" r:id="rId40"/>
-    <p:sldId id="303" r:id="rId41"/>
-    <p:sldId id="307" r:id="rId42"/>
-    <p:sldId id="274" r:id="rId43"/>
-    <p:sldId id="292" r:id="rId44"/>
-    <p:sldId id="280" r:id="rId45"/>
-    <p:sldId id="281" r:id="rId46"/>
-    <p:sldId id="293" r:id="rId47"/>
-    <p:sldId id="275" r:id="rId48"/>
-    <p:sldId id="284" r:id="rId49"/>
-    <p:sldId id="283" r:id="rId50"/>
-    <p:sldId id="285" r:id="rId51"/>
+    <p:sldId id="308" r:id="rId14"/>
+    <p:sldId id="295" r:id="rId15"/>
+    <p:sldId id="269" r:id="rId16"/>
+    <p:sldId id="305" r:id="rId17"/>
+    <p:sldId id="304" r:id="rId18"/>
+    <p:sldId id="300" r:id="rId19"/>
+    <p:sldId id="296" r:id="rId20"/>
+    <p:sldId id="267" r:id="rId21"/>
+    <p:sldId id="266" r:id="rId22"/>
+    <p:sldId id="270" r:id="rId23"/>
+    <p:sldId id="289" r:id="rId24"/>
+    <p:sldId id="291" r:id="rId25"/>
+    <p:sldId id="298" r:id="rId26"/>
+    <p:sldId id="271" r:id="rId27"/>
+    <p:sldId id="297" r:id="rId28"/>
+    <p:sldId id="299" r:id="rId29"/>
+    <p:sldId id="290" r:id="rId30"/>
+    <p:sldId id="273" r:id="rId31"/>
+    <p:sldId id="277" r:id="rId32"/>
+    <p:sldId id="287" r:id="rId33"/>
+    <p:sldId id="278" r:id="rId34"/>
+    <p:sldId id="279" r:id="rId35"/>
+    <p:sldId id="276" r:id="rId36"/>
+    <p:sldId id="294" r:id="rId37"/>
+    <p:sldId id="286" r:id="rId38"/>
+    <p:sldId id="282" r:id="rId39"/>
+    <p:sldId id="306" r:id="rId40"/>
+    <p:sldId id="302" r:id="rId41"/>
+    <p:sldId id="303" r:id="rId42"/>
+    <p:sldId id="307" r:id="rId43"/>
+    <p:sldId id="274" r:id="rId44"/>
+    <p:sldId id="292" r:id="rId45"/>
+    <p:sldId id="280" r:id="rId46"/>
+    <p:sldId id="281" r:id="rId47"/>
+    <p:sldId id="293" r:id="rId48"/>
+    <p:sldId id="275" r:id="rId49"/>
+    <p:sldId id="284" r:id="rId50"/>
+    <p:sldId id="283" r:id="rId51"/>
+    <p:sldId id="285" r:id="rId52"/>
   </p:sldIdLst>
   <p:sldSz cx="9144000" cy="6858000" type="screen4x3"/>
   <p:notesSz cx="6858000" cy="9144000"/>
@@ -4250,6 +4251,13 @@
         </dgm:presLayoutVars>
       </dgm:prSet>
       <dgm:spPr/>
+      <dgm:t>
+        <a:bodyPr/>
+        <a:lstStyle/>
+        <a:p>
+          <a:endParaRPr lang="de-DE"/>
+        </a:p>
+      </dgm:t>
     </dgm:pt>
     <dgm:pt modelId="{CA26B721-A575-42F4-82AA-E993F9F0DC68}" type="pres">
       <dgm:prSet presAssocID="{7EAD8F7A-9DB7-4B1B-893D-3336DC258751}" presName="centerShape" presStyleLbl="node0" presStyleIdx="0" presStyleCnt="1"/>
@@ -4265,6 +4273,13 @@
     <dgm:pt modelId="{83F75E8B-4733-4F4E-8610-50C8667C09F1}" type="pres">
       <dgm:prSet presAssocID="{D1F45976-B1E5-4D88-A7A1-756D998F2BBA}" presName="parTrans" presStyleLbl="bgSibTrans2D1" presStyleIdx="0" presStyleCnt="7"/>
       <dgm:spPr/>
+      <dgm:t>
+        <a:bodyPr/>
+        <a:lstStyle/>
+        <a:p>
+          <a:endParaRPr lang="de-DE"/>
+        </a:p>
+      </dgm:t>
     </dgm:pt>
     <dgm:pt modelId="{54797441-BD4D-498A-A722-937995F3E772}" type="pres">
       <dgm:prSet presAssocID="{EABC61B3-D00E-48EB-BD2C-BB61EBD3F363}" presName="node" presStyleLbl="node1" presStyleIdx="0" presStyleCnt="7">
@@ -4717,6 +4732,13 @@
         </dgm:presLayoutVars>
       </dgm:prSet>
       <dgm:spPr/>
+      <dgm:t>
+        <a:bodyPr/>
+        <a:lstStyle/>
+        <a:p>
+          <a:endParaRPr lang="de-DE"/>
+        </a:p>
+      </dgm:t>
     </dgm:pt>
     <dgm:pt modelId="{CA26B721-A575-42F4-82AA-E993F9F0DC68}" type="pres">
       <dgm:prSet presAssocID="{7EAD8F7A-9DB7-4B1B-893D-3336DC258751}" presName="centerShape" presStyleLbl="node0" presStyleIdx="0" presStyleCnt="1"/>
@@ -4732,6 +4754,13 @@
     <dgm:pt modelId="{83F75E8B-4733-4F4E-8610-50C8667C09F1}" type="pres">
       <dgm:prSet presAssocID="{D1F45976-B1E5-4D88-A7A1-756D998F2BBA}" presName="parTrans" presStyleLbl="bgSibTrans2D1" presStyleIdx="0" presStyleCnt="4"/>
       <dgm:spPr/>
+      <dgm:t>
+        <a:bodyPr/>
+        <a:lstStyle/>
+        <a:p>
+          <a:endParaRPr lang="de-DE"/>
+        </a:p>
+      </dgm:t>
     </dgm:pt>
     <dgm:pt modelId="{54797441-BD4D-498A-A722-937995F3E772}" type="pres">
       <dgm:prSet presAssocID="{EABC61B3-D00E-48EB-BD2C-BB61EBD3F363}" presName="node" presStyleLbl="node1" presStyleIdx="0" presStyleCnt="4">
@@ -4751,6 +4780,13 @@
     <dgm:pt modelId="{5ECEE574-1A63-41B4-BAA9-37A076EA4507}" type="pres">
       <dgm:prSet presAssocID="{42537EDD-B15B-4092-AE66-EC0B59FF78CF}" presName="parTrans" presStyleLbl="bgSibTrans2D1" presStyleIdx="1" presStyleCnt="4"/>
       <dgm:spPr/>
+      <dgm:t>
+        <a:bodyPr/>
+        <a:lstStyle/>
+        <a:p>
+          <a:endParaRPr lang="de-DE"/>
+        </a:p>
+      </dgm:t>
     </dgm:pt>
     <dgm:pt modelId="{0ACBB609-71BE-4BE3-A09B-1FECCDAD74A7}" type="pres">
       <dgm:prSet presAssocID="{AE0FE4B1-F67E-436A-B6D8-9A58130F1206}" presName="node" presStyleLbl="node1" presStyleIdx="1" presStyleCnt="4">
@@ -4759,6 +4795,13 @@
         </dgm:presLayoutVars>
       </dgm:prSet>
       <dgm:spPr/>
+      <dgm:t>
+        <a:bodyPr/>
+        <a:lstStyle/>
+        <a:p>
+          <a:endParaRPr lang="de-DE"/>
+        </a:p>
+      </dgm:t>
     </dgm:pt>
     <dgm:pt modelId="{508B7486-5AFB-4DF3-ADDD-F38CD363379E}" type="pres">
       <dgm:prSet presAssocID="{5554DACC-4E95-4B90-8FED-B765789FAC90}" presName="parTrans" presStyleLbl="bgSibTrans2D1" presStyleIdx="2" presStyleCnt="4"/>
@@ -4782,6 +4825,13 @@
     <dgm:pt modelId="{C57E8450-258C-404C-B4DA-CE5DF3D92C7D}" type="pres">
       <dgm:prSet presAssocID="{B5DFA4EB-72BC-4C24-8CC9-5B0A8398B9EB}" presName="parTrans" presStyleLbl="bgSibTrans2D1" presStyleIdx="3" presStyleCnt="4"/>
       <dgm:spPr/>
+      <dgm:t>
+        <a:bodyPr/>
+        <a:lstStyle/>
+        <a:p>
+          <a:endParaRPr lang="de-DE"/>
+        </a:p>
+      </dgm:t>
     </dgm:pt>
     <dgm:pt modelId="{C2553EEB-444A-4C59-AB6C-0E96B10C2012}" type="pres">
       <dgm:prSet presAssocID="{CBD3B9DA-A467-434B-8206-507A5B68C725}" presName="node" presStyleLbl="node1" presStyleIdx="3" presStyleCnt="4">
@@ -4970,6 +5020,13 @@
         </dgm:presLayoutVars>
       </dgm:prSet>
       <dgm:spPr/>
+      <dgm:t>
+        <a:bodyPr/>
+        <a:lstStyle/>
+        <a:p>
+          <a:endParaRPr lang="de-DE"/>
+        </a:p>
+      </dgm:t>
     </dgm:pt>
     <dgm:pt modelId="{CA26B721-A575-42F4-82AA-E993F9F0DC68}" type="pres">
       <dgm:prSet presAssocID="{7EAD8F7A-9DB7-4B1B-893D-3336DC258751}" presName="centerShape" presStyleLbl="node0" presStyleIdx="0" presStyleCnt="1"/>
@@ -4985,6 +5042,13 @@
     <dgm:pt modelId="{83F75E8B-4733-4F4E-8610-50C8667C09F1}" type="pres">
       <dgm:prSet presAssocID="{D1F45976-B1E5-4D88-A7A1-756D998F2BBA}" presName="parTrans" presStyleLbl="bgSibTrans2D1" presStyleIdx="0" presStyleCnt="1"/>
       <dgm:spPr/>
+      <dgm:t>
+        <a:bodyPr/>
+        <a:lstStyle/>
+        <a:p>
+          <a:endParaRPr lang="de-DE"/>
+        </a:p>
+      </dgm:t>
     </dgm:pt>
     <dgm:pt modelId="{54797441-BD4D-498A-A722-937995F3E772}" type="pres">
       <dgm:prSet presAssocID="{EABC61B3-D00E-48EB-BD2C-BB61EBD3F363}" presName="node" presStyleLbl="node1" presStyleIdx="0" presStyleCnt="1">
@@ -5349,6 +5413,13 @@
         </dgm:presLayoutVars>
       </dgm:prSet>
       <dgm:spPr/>
+      <dgm:t>
+        <a:bodyPr/>
+        <a:lstStyle/>
+        <a:p>
+          <a:endParaRPr lang="de-DE"/>
+        </a:p>
+      </dgm:t>
     </dgm:pt>
     <dgm:pt modelId="{373BF6F3-3DF1-4CA5-B89A-07ACBE996282}" type="pres">
       <dgm:prSet presAssocID="{4439366F-97E7-4991-B228-72C25D40EEFE}" presName="node" presStyleLbl="node1" presStyleIdx="0" presStyleCnt="6">
@@ -5368,10 +5439,24 @@
     <dgm:pt modelId="{ADB692B2-2D3B-4C43-BE7E-C5F6C35A11C5}" type="pres">
       <dgm:prSet presAssocID="{A841D60F-9097-42BB-80D2-7B4A5370B048}" presName="sibTrans" presStyleLbl="sibTrans2D1" presStyleIdx="0" presStyleCnt="5"/>
       <dgm:spPr/>
+      <dgm:t>
+        <a:bodyPr/>
+        <a:lstStyle/>
+        <a:p>
+          <a:endParaRPr lang="de-DE"/>
+        </a:p>
+      </dgm:t>
     </dgm:pt>
     <dgm:pt modelId="{C70C0978-07C5-447D-9B54-DB83856583A0}" type="pres">
       <dgm:prSet presAssocID="{A841D60F-9097-42BB-80D2-7B4A5370B048}" presName="connectorText" presStyleLbl="sibTrans2D1" presStyleIdx="0" presStyleCnt="5"/>
       <dgm:spPr/>
+      <dgm:t>
+        <a:bodyPr/>
+        <a:lstStyle/>
+        <a:p>
+          <a:endParaRPr lang="de-DE"/>
+        </a:p>
+      </dgm:t>
     </dgm:pt>
     <dgm:pt modelId="{83DFBCFB-1A77-4600-82D5-2C730195F1FD}" type="pres">
       <dgm:prSet presAssocID="{16EED6FC-B011-48E2-889C-1A190FAA9B07}" presName="node" presStyleLbl="node1" presStyleIdx="1" presStyleCnt="6">
@@ -5380,14 +5465,35 @@
         </dgm:presLayoutVars>
       </dgm:prSet>
       <dgm:spPr/>
+      <dgm:t>
+        <a:bodyPr/>
+        <a:lstStyle/>
+        <a:p>
+          <a:endParaRPr lang="de-DE"/>
+        </a:p>
+      </dgm:t>
     </dgm:pt>
     <dgm:pt modelId="{8541E5EF-5C05-4736-B119-B432C7C7C88B}" type="pres">
       <dgm:prSet presAssocID="{88FC0A8A-30EA-4F56-B83F-F037B05D091B}" presName="sibTrans" presStyleLbl="sibTrans2D1" presStyleIdx="1" presStyleCnt="5"/>
       <dgm:spPr/>
+      <dgm:t>
+        <a:bodyPr/>
+        <a:lstStyle/>
+        <a:p>
+          <a:endParaRPr lang="de-DE"/>
+        </a:p>
+      </dgm:t>
     </dgm:pt>
     <dgm:pt modelId="{7124E8AA-CDD7-4ABD-98E1-2ACA054E9A12}" type="pres">
       <dgm:prSet presAssocID="{88FC0A8A-30EA-4F56-B83F-F037B05D091B}" presName="connectorText" presStyleLbl="sibTrans2D1" presStyleIdx="1" presStyleCnt="5"/>
       <dgm:spPr/>
+      <dgm:t>
+        <a:bodyPr/>
+        <a:lstStyle/>
+        <a:p>
+          <a:endParaRPr lang="de-DE"/>
+        </a:p>
+      </dgm:t>
     </dgm:pt>
     <dgm:pt modelId="{B4955155-117C-4D1A-82DC-072A411A956E}" type="pres">
       <dgm:prSet presAssocID="{24629149-9C35-4F7F-BCC0-DE10AB2D8195}" presName="node" presStyleLbl="node1" presStyleIdx="2" presStyleCnt="6">
@@ -5407,10 +5513,24 @@
     <dgm:pt modelId="{B29782B5-4744-4F64-A16B-10ED070EFCFB}" type="pres">
       <dgm:prSet presAssocID="{DE307E1F-0BBC-4331-B17F-97C68000C1E3}" presName="sibTrans" presStyleLbl="sibTrans2D1" presStyleIdx="2" presStyleCnt="5"/>
       <dgm:spPr/>
+      <dgm:t>
+        <a:bodyPr/>
+        <a:lstStyle/>
+        <a:p>
+          <a:endParaRPr lang="de-DE"/>
+        </a:p>
+      </dgm:t>
     </dgm:pt>
     <dgm:pt modelId="{CFECA165-D687-4EB8-92A2-8593FAED4357}" type="pres">
       <dgm:prSet presAssocID="{DE307E1F-0BBC-4331-B17F-97C68000C1E3}" presName="connectorText" presStyleLbl="sibTrans2D1" presStyleIdx="2" presStyleCnt="5"/>
       <dgm:spPr/>
+      <dgm:t>
+        <a:bodyPr/>
+        <a:lstStyle/>
+        <a:p>
+          <a:endParaRPr lang="de-DE"/>
+        </a:p>
+      </dgm:t>
     </dgm:pt>
     <dgm:pt modelId="{D0255911-F565-48E0-BBA1-6581B96BE1FA}" type="pres">
       <dgm:prSet presAssocID="{4F2D807A-771B-4A72-A2F7-0962A76C9F90}" presName="node" presStyleLbl="node1" presStyleIdx="3" presStyleCnt="6">
@@ -5419,14 +5539,35 @@
         </dgm:presLayoutVars>
       </dgm:prSet>
       <dgm:spPr/>
+      <dgm:t>
+        <a:bodyPr/>
+        <a:lstStyle/>
+        <a:p>
+          <a:endParaRPr lang="de-DE"/>
+        </a:p>
+      </dgm:t>
     </dgm:pt>
     <dgm:pt modelId="{7F8F2DF2-5EDF-41A5-A639-8B3D1E0687CE}" type="pres">
       <dgm:prSet presAssocID="{98D52442-9EC2-49DA-90A7-5C7B7C858FDD}" presName="sibTrans" presStyleLbl="sibTrans2D1" presStyleIdx="3" presStyleCnt="5"/>
       <dgm:spPr/>
+      <dgm:t>
+        <a:bodyPr/>
+        <a:lstStyle/>
+        <a:p>
+          <a:endParaRPr lang="de-DE"/>
+        </a:p>
+      </dgm:t>
     </dgm:pt>
     <dgm:pt modelId="{B671DBD8-4ACC-40D9-B3EB-C3AEA240C60C}" type="pres">
       <dgm:prSet presAssocID="{98D52442-9EC2-49DA-90A7-5C7B7C858FDD}" presName="connectorText" presStyleLbl="sibTrans2D1" presStyleIdx="3" presStyleCnt="5"/>
       <dgm:spPr/>
+      <dgm:t>
+        <a:bodyPr/>
+        <a:lstStyle/>
+        <a:p>
+          <a:endParaRPr lang="de-DE"/>
+        </a:p>
+      </dgm:t>
     </dgm:pt>
     <dgm:pt modelId="{84C1DEBE-ACB9-4EE0-98C4-2338955A23E8}" type="pres">
       <dgm:prSet presAssocID="{40B9DF26-E53E-454E-8A8C-D9B13D4A4280}" presName="node" presStyleLbl="node1" presStyleIdx="4" presStyleCnt="6">
@@ -5446,10 +5587,24 @@
     <dgm:pt modelId="{C0B4211D-D571-46F4-8144-EF1608B8B2BA}" type="pres">
       <dgm:prSet presAssocID="{243529E8-D2CA-44C5-9150-81F151CCD222}" presName="sibTrans" presStyleLbl="sibTrans2D1" presStyleIdx="4" presStyleCnt="5"/>
       <dgm:spPr/>
+      <dgm:t>
+        <a:bodyPr/>
+        <a:lstStyle/>
+        <a:p>
+          <a:endParaRPr lang="de-DE"/>
+        </a:p>
+      </dgm:t>
     </dgm:pt>
     <dgm:pt modelId="{42CC177A-BB1D-4B07-8FC2-57FA1EB49465}" type="pres">
       <dgm:prSet presAssocID="{243529E8-D2CA-44C5-9150-81F151CCD222}" presName="connectorText" presStyleLbl="sibTrans2D1" presStyleIdx="4" presStyleCnt="5"/>
       <dgm:spPr/>
+      <dgm:t>
+        <a:bodyPr/>
+        <a:lstStyle/>
+        <a:p>
+          <a:endParaRPr lang="de-DE"/>
+        </a:p>
+      </dgm:t>
     </dgm:pt>
     <dgm:pt modelId="{895B9203-2ADD-4C35-9923-FCC89283D119}" type="pres">
       <dgm:prSet presAssocID="{E2F2F9AA-E8CB-4334-AA5D-0335EA1AB823}" presName="node" presStyleLbl="node1" presStyleIdx="5" presStyleCnt="6">
@@ -5469,8 +5624,8 @@
   </dgm:ptLst>
   <dgm:cxnLst>
     <dgm:cxn modelId="{03C3560B-9BFB-4C69-926A-6D8A7D0A51FB}" type="presOf" srcId="{4F2D807A-771B-4A72-A2F7-0962A76C9F90}" destId="{D0255911-F565-48E0-BBA1-6581B96BE1FA}" srcOrd="0" destOrd="0" presId="urn:microsoft.com/office/officeart/2005/8/layout/process5"/>
+    <dgm:cxn modelId="{1B211697-EC80-4480-A761-2A43EBE49D9A}" type="presOf" srcId="{243529E8-D2CA-44C5-9150-81F151CCD222}" destId="{42CC177A-BB1D-4B07-8FC2-57FA1EB49465}" srcOrd="1" destOrd="0" presId="urn:microsoft.com/office/officeart/2005/8/layout/process5"/>
     <dgm:cxn modelId="{6D8957D4-08F9-4DC3-952C-6F8688347A92}" srcId="{8A79986A-8F5F-4A57-9BC8-5483AD9DDFE6}" destId="{16EED6FC-B011-48E2-889C-1A190FAA9B07}" srcOrd="1" destOrd="0" parTransId="{CAA9D4D7-4CB9-4D3B-B510-52EF96162406}" sibTransId="{88FC0A8A-30EA-4F56-B83F-F037B05D091B}"/>
-    <dgm:cxn modelId="{1B211697-EC80-4480-A761-2A43EBE49D9A}" type="presOf" srcId="{243529E8-D2CA-44C5-9150-81F151CCD222}" destId="{42CC177A-BB1D-4B07-8FC2-57FA1EB49465}" srcOrd="1" destOrd="0" presId="urn:microsoft.com/office/officeart/2005/8/layout/process5"/>
     <dgm:cxn modelId="{83D4C337-1A6C-4C49-BE92-233BCF46DF84}" srcId="{8A79986A-8F5F-4A57-9BC8-5483AD9DDFE6}" destId="{40B9DF26-E53E-454E-8A8C-D9B13D4A4280}" srcOrd="4" destOrd="0" parTransId="{F046E177-596E-43EB-896A-296E342297D8}" sibTransId="{243529E8-D2CA-44C5-9150-81F151CCD222}"/>
     <dgm:cxn modelId="{42E14FB2-FBE8-4817-84CE-9245B43EC7DF}" srcId="{8A79986A-8F5F-4A57-9BC8-5483AD9DDFE6}" destId="{4F2D807A-771B-4A72-A2F7-0962A76C9F90}" srcOrd="3" destOrd="0" parTransId="{FAF31B6D-D592-423E-A5E5-7FB538DB3BFE}" sibTransId="{98D52442-9EC2-49DA-90A7-5C7B7C858FDD}"/>
     <dgm:cxn modelId="{A65598A4-1D7F-43B7-A081-3A3B2C035BD6}" type="presOf" srcId="{24629149-9C35-4F7F-BCC0-DE10AB2D8195}" destId="{B4955155-117C-4D1A-82DC-072A411A956E}" srcOrd="0" destOrd="0" presId="urn:microsoft.com/office/officeart/2005/8/layout/process5"/>
@@ -5478,8 +5633,8 @@
     <dgm:cxn modelId="{18F4B0C8-58E6-4B0E-8FEF-B46A054811AD}" type="presOf" srcId="{DE307E1F-0BBC-4331-B17F-97C68000C1E3}" destId="{B29782B5-4744-4F64-A16B-10ED070EFCFB}" srcOrd="0" destOrd="0" presId="urn:microsoft.com/office/officeart/2005/8/layout/process5"/>
     <dgm:cxn modelId="{5804847D-A9AF-4511-8DFA-FBC1CB21B69B}" srcId="{8A79986A-8F5F-4A57-9BC8-5483AD9DDFE6}" destId="{24629149-9C35-4F7F-BCC0-DE10AB2D8195}" srcOrd="2" destOrd="0" parTransId="{B06043D3-34FE-4B7B-91C7-7D2F43DD997A}" sibTransId="{DE307E1F-0BBC-4331-B17F-97C68000C1E3}"/>
     <dgm:cxn modelId="{698474FC-846B-4D44-A625-965298DB12A4}" type="presOf" srcId="{88FC0A8A-30EA-4F56-B83F-F037B05D091B}" destId="{7124E8AA-CDD7-4ABD-98E1-2ACA054E9A12}" srcOrd="1" destOrd="0" presId="urn:microsoft.com/office/officeart/2005/8/layout/process5"/>
+    <dgm:cxn modelId="{3A8F41D3-EDD8-48F7-B608-6734D44AC951}" type="presOf" srcId="{E2F2F9AA-E8CB-4334-AA5D-0335EA1AB823}" destId="{895B9203-2ADD-4C35-9923-FCC89283D119}" srcOrd="0" destOrd="0" presId="urn:microsoft.com/office/officeart/2005/8/layout/process5"/>
     <dgm:cxn modelId="{AB290CC3-F005-4010-90BC-DE07027E94AD}" srcId="{8A79986A-8F5F-4A57-9BC8-5483AD9DDFE6}" destId="{E2F2F9AA-E8CB-4334-AA5D-0335EA1AB823}" srcOrd="5" destOrd="0" parTransId="{02262158-FB6A-470A-916C-0C4F010CAE45}" sibTransId="{992CD643-6FF8-44AF-A127-E4F772DD6302}"/>
-    <dgm:cxn modelId="{3A8F41D3-EDD8-48F7-B608-6734D44AC951}" type="presOf" srcId="{E2F2F9AA-E8CB-4334-AA5D-0335EA1AB823}" destId="{895B9203-2ADD-4C35-9923-FCC89283D119}" srcOrd="0" destOrd="0" presId="urn:microsoft.com/office/officeart/2005/8/layout/process5"/>
     <dgm:cxn modelId="{35512F70-896C-46E0-941D-8E13516230D2}" type="presOf" srcId="{4439366F-97E7-4991-B228-72C25D40EEFE}" destId="{373BF6F3-3DF1-4CA5-B89A-07ACBE996282}" srcOrd="0" destOrd="0" presId="urn:microsoft.com/office/officeart/2005/8/layout/process5"/>
     <dgm:cxn modelId="{BADF65E0-C3D2-4E96-B787-12B8BF709483}" type="presOf" srcId="{8A79986A-8F5F-4A57-9BC8-5483AD9DDFE6}" destId="{F99660E5-B9EF-45EC-9DC4-460006EFFB31}" srcOrd="0" destOrd="0" presId="urn:microsoft.com/office/officeart/2005/8/layout/process5"/>
     <dgm:cxn modelId="{EAEEDD79-FD34-42A3-814B-0B064C957B10}" type="presOf" srcId="{243529E8-D2CA-44C5-9150-81F151CCD222}" destId="{C0B4211D-D571-46F4-8144-EF1608B8B2BA}" srcOrd="0" destOrd="0" presId="urn:microsoft.com/office/officeart/2005/8/layout/process5"/>
@@ -5995,10 +6150,24 @@
     <dgm:pt modelId="{72C415BA-6BB3-4B68-AB13-AF863FA098DC}" type="pres">
       <dgm:prSet presAssocID="{425719E3-B422-477E-B4C0-CCEA11E31F91}" presName="sibTrans" presStyleLbl="sibTrans2D1" presStyleIdx="0" presStyleCnt="3"/>
       <dgm:spPr/>
+      <dgm:t>
+        <a:bodyPr/>
+        <a:lstStyle/>
+        <a:p>
+          <a:endParaRPr lang="de-DE"/>
+        </a:p>
+      </dgm:t>
     </dgm:pt>
     <dgm:pt modelId="{84221EE1-7805-497C-BBCB-B12F0CF8450D}" type="pres">
       <dgm:prSet presAssocID="{425719E3-B422-477E-B4C0-CCEA11E31F91}" presName="connectorText" presStyleLbl="sibTrans2D1" presStyleIdx="0" presStyleCnt="3"/>
       <dgm:spPr/>
+      <dgm:t>
+        <a:bodyPr/>
+        <a:lstStyle/>
+        <a:p>
+          <a:endParaRPr lang="de-DE"/>
+        </a:p>
+      </dgm:t>
     </dgm:pt>
     <dgm:pt modelId="{67E5ABC1-15D0-4E7D-9A3F-ABABE7B1EE43}" type="pres">
       <dgm:prSet presAssocID="{96393E70-71DE-40EB-BEF4-3C87355EF1C7}" presName="node" presStyleLbl="node1" presStyleIdx="1" presStyleCnt="4">
@@ -6007,14 +6176,35 @@
         </dgm:presLayoutVars>
       </dgm:prSet>
       <dgm:spPr/>
+      <dgm:t>
+        <a:bodyPr/>
+        <a:lstStyle/>
+        <a:p>
+          <a:endParaRPr lang="de-DE"/>
+        </a:p>
+      </dgm:t>
     </dgm:pt>
     <dgm:pt modelId="{4FE70845-0908-4593-BC16-BD9F265E4E09}" type="pres">
       <dgm:prSet presAssocID="{036CC96A-EA18-40C4-95F6-113799A33A01}" presName="sibTrans" presStyleLbl="sibTrans2D1" presStyleIdx="1" presStyleCnt="3"/>
       <dgm:spPr/>
+      <dgm:t>
+        <a:bodyPr/>
+        <a:lstStyle/>
+        <a:p>
+          <a:endParaRPr lang="de-DE"/>
+        </a:p>
+      </dgm:t>
     </dgm:pt>
     <dgm:pt modelId="{5FF2F506-4D9D-46F8-8FBB-4D2AB962D6A6}" type="pres">
       <dgm:prSet presAssocID="{036CC96A-EA18-40C4-95F6-113799A33A01}" presName="connectorText" presStyleLbl="sibTrans2D1" presStyleIdx="1" presStyleCnt="3"/>
       <dgm:spPr/>
+      <dgm:t>
+        <a:bodyPr/>
+        <a:lstStyle/>
+        <a:p>
+          <a:endParaRPr lang="de-DE"/>
+        </a:p>
+      </dgm:t>
     </dgm:pt>
     <dgm:pt modelId="{134A918B-C11C-49B8-8C69-3920F9DBB046}" type="pres">
       <dgm:prSet presAssocID="{5BCC5825-0A2E-4168-A6B1-4EAE70E6B9F4}" presName="node" presStyleLbl="node1" presStyleIdx="2" presStyleCnt="4">
@@ -6034,10 +6224,24 @@
     <dgm:pt modelId="{9D638717-3283-4FDF-BAF0-591A24424E8A}" type="pres">
       <dgm:prSet presAssocID="{228C745E-EE78-4B30-BFBE-B83EF82FB524}" presName="sibTrans" presStyleLbl="sibTrans2D1" presStyleIdx="2" presStyleCnt="3"/>
       <dgm:spPr/>
+      <dgm:t>
+        <a:bodyPr/>
+        <a:lstStyle/>
+        <a:p>
+          <a:endParaRPr lang="de-DE"/>
+        </a:p>
+      </dgm:t>
     </dgm:pt>
     <dgm:pt modelId="{D422830F-F9F1-4BF0-BD8B-F2698E1990C4}" type="pres">
       <dgm:prSet presAssocID="{228C745E-EE78-4B30-BFBE-B83EF82FB524}" presName="connectorText" presStyleLbl="sibTrans2D1" presStyleIdx="2" presStyleCnt="3"/>
       <dgm:spPr/>
+      <dgm:t>
+        <a:bodyPr/>
+        <a:lstStyle/>
+        <a:p>
+          <a:endParaRPr lang="de-DE"/>
+        </a:p>
+      </dgm:t>
     </dgm:pt>
     <dgm:pt modelId="{EDA6F320-6716-47C5-ABFC-4D7C47D97B83}" type="pres">
       <dgm:prSet presAssocID="{8B30C927-60A0-48AE-B93C-8AC049F940C5}" presName="node" presStyleLbl="node1" presStyleIdx="3" presStyleCnt="4">
@@ -6056,37 +6260,37 @@
     </dgm:pt>
   </dgm:ptLst>
   <dgm:cxnLst>
+    <dgm:cxn modelId="{627033AB-AB92-43A4-9439-AA4B322978F3}" srcId="{8B30C927-60A0-48AE-B93C-8AC049F940C5}" destId="{2A28C605-9ED8-460C-818C-DF68FB864511}" srcOrd="0" destOrd="0" parTransId="{504F7B9D-E9ED-41E7-9355-D07F80C9CA3C}" sibTransId="{63FC1D30-1987-427A-9363-5611BA175B93}"/>
+    <dgm:cxn modelId="{C5966972-D659-4572-BA0A-1BE21AC48E8B}" type="presOf" srcId="{FCCD0AAB-B0A6-4827-8641-7466DB8EEDDF}" destId="{134A918B-C11C-49B8-8C69-3920F9DBB046}" srcOrd="0" destOrd="1" presId="urn:microsoft.com/office/officeart/2005/8/layout/process1"/>
+    <dgm:cxn modelId="{CD2A88E2-F27D-4F6B-B18A-08E97B885332}" srcId="{F66F622A-412F-4159-A10E-C26A5DF6F3F5}" destId="{96393E70-71DE-40EB-BEF4-3C87355EF1C7}" srcOrd="1" destOrd="0" parTransId="{F1BD0063-44E9-432C-82F3-783DAA7A16D0}" sibTransId="{036CC96A-EA18-40C4-95F6-113799A33A01}"/>
+    <dgm:cxn modelId="{D1918E8A-76A1-4224-A5D7-6CD5E9EFAC4A}" type="presOf" srcId="{8ADB99C1-AF2F-4EE6-8A4F-60E301AB5D85}" destId="{134A918B-C11C-49B8-8C69-3920F9DBB046}" srcOrd="0" destOrd="3" presId="urn:microsoft.com/office/officeart/2005/8/layout/process1"/>
+    <dgm:cxn modelId="{F32A4FEA-432B-4A31-8A80-20506EE2ACF4}" srcId="{F66F622A-412F-4159-A10E-C26A5DF6F3F5}" destId="{8B30C927-60A0-48AE-B93C-8AC049F940C5}" srcOrd="3" destOrd="0" parTransId="{685D3872-34CC-4FDC-AB60-1DFC260A3206}" sibTransId="{70A345BF-9B9F-45F2-B5D6-B08373C132FF}"/>
+    <dgm:cxn modelId="{833D5304-056E-4393-8D92-F6B60915F157}" srcId="{F66F622A-412F-4159-A10E-C26A5DF6F3F5}" destId="{1EDBC1C5-57DC-4614-86DC-64AF93079E2E}" srcOrd="0" destOrd="0" parTransId="{2DE2BB77-32E4-435A-BBFF-8A104098B905}" sibTransId="{425719E3-B422-477E-B4C0-CCEA11E31F91}"/>
     <dgm:cxn modelId="{FDB7FB00-A0ED-41A5-BCA6-BA961FC85DF2}" type="presOf" srcId="{425719E3-B422-477E-B4C0-CCEA11E31F91}" destId="{84221EE1-7805-497C-BBCB-B12F0CF8450D}" srcOrd="1" destOrd="0" presId="urn:microsoft.com/office/officeart/2005/8/layout/process1"/>
+    <dgm:cxn modelId="{84B180F1-FAB1-46A0-8F3F-FA857B79D1A2}" srcId="{96393E70-71DE-40EB-BEF4-3C87355EF1C7}" destId="{9736F69C-3F93-47E9-B3A9-30A026D79F48}" srcOrd="0" destOrd="0" parTransId="{8A65CFFD-8BAA-4AEE-AA9E-2A4C75925C2D}" sibTransId="{10EF2364-0FDE-4F09-BFBC-91BF0E9322D5}"/>
     <dgm:cxn modelId="{62DFB5A7-C2A8-408E-91D5-32B4F547E54F}" type="presOf" srcId="{96393E70-71DE-40EB-BEF4-3C87355EF1C7}" destId="{67E5ABC1-15D0-4E7D-9A3F-ABABE7B1EE43}" srcOrd="0" destOrd="0" presId="urn:microsoft.com/office/officeart/2005/8/layout/process1"/>
+    <dgm:cxn modelId="{25FE3E61-D4DB-4A0A-9F9F-4477F991347B}" srcId="{5BCC5825-0A2E-4168-A6B1-4EAE70E6B9F4}" destId="{8ADB99C1-AF2F-4EE6-8A4F-60E301AB5D85}" srcOrd="2" destOrd="0" parTransId="{C5C6B2F6-4C52-4208-A8E9-33220813A0C3}" sibTransId="{2F647334-3C04-4E83-B937-02FDD1EC07D2}"/>
+    <dgm:cxn modelId="{F11AA28E-AAD2-430A-B198-54F2849EB9ED}" srcId="{5BCC5825-0A2E-4168-A6B1-4EAE70E6B9F4}" destId="{137A53C6-D15D-4424-B0A7-0007ABC23E37}" srcOrd="1" destOrd="0" parTransId="{F9BB8056-68AB-492C-9BDF-A575AB95445E}" sibTransId="{21C91749-A901-47F6-80C7-3A9412B61DE6}"/>
+    <dgm:cxn modelId="{CB92A82F-839F-4945-AE5C-3ECA8FD6A9CE}" type="presOf" srcId="{036CC96A-EA18-40C4-95F6-113799A33A01}" destId="{5FF2F506-4D9D-46F8-8FBB-4D2AB962D6A6}" srcOrd="1" destOrd="0" presId="urn:microsoft.com/office/officeart/2005/8/layout/process1"/>
+    <dgm:cxn modelId="{B094D6E8-62AB-477C-A316-9276314925B8}" type="presOf" srcId="{84AA71C9-DFA2-4A99-BBCD-FD50D41AE8DC}" destId="{67E5ABC1-15D0-4E7D-9A3F-ABABE7B1EE43}" srcOrd="0" destOrd="3" presId="urn:microsoft.com/office/officeart/2005/8/layout/process1"/>
+    <dgm:cxn modelId="{40DD65F3-16F8-4934-8FC7-4F0B1D7F9764}" type="presOf" srcId="{137A53C6-D15D-4424-B0A7-0007ABC23E37}" destId="{134A918B-C11C-49B8-8C69-3920F9DBB046}" srcOrd="0" destOrd="2" presId="urn:microsoft.com/office/officeart/2005/8/layout/process1"/>
+    <dgm:cxn modelId="{AB95409D-7E50-4B22-858E-AD32BFA18EE1}" srcId="{1EDBC1C5-57DC-4614-86DC-64AF93079E2E}" destId="{096B117D-CFAE-4B97-B577-A848A7EE76E9}" srcOrd="0" destOrd="0" parTransId="{76992C34-60FD-4CB7-9701-FAF883758CD7}" sibTransId="{5683E833-DAED-4442-8A66-737E6E480BD0}"/>
+    <dgm:cxn modelId="{ED55B44E-7909-42FE-8543-3D40F6A08AA9}" srcId="{5BCC5825-0A2E-4168-A6B1-4EAE70E6B9F4}" destId="{FCCD0AAB-B0A6-4827-8641-7466DB8EEDDF}" srcOrd="0" destOrd="0" parTransId="{F6F77263-5240-4983-998B-58F84BB76F60}" sibTransId="{715512A7-D065-457D-B4BC-2F56998656BD}"/>
+    <dgm:cxn modelId="{57063810-672A-467A-A1FE-4DBF81CD0DC5}" type="presOf" srcId="{9736F69C-3F93-47E9-B3A9-30A026D79F48}" destId="{67E5ABC1-15D0-4E7D-9A3F-ABABE7B1EE43}" srcOrd="0" destOrd="1" presId="urn:microsoft.com/office/officeart/2005/8/layout/process1"/>
+    <dgm:cxn modelId="{A4AF87A0-CAE7-4717-90C1-B2412A750EAE}" type="presOf" srcId="{2A28C605-9ED8-460C-818C-DF68FB864511}" destId="{EDA6F320-6716-47C5-ABFC-4D7C47D97B83}" srcOrd="0" destOrd="1" presId="urn:microsoft.com/office/officeart/2005/8/layout/process1"/>
+    <dgm:cxn modelId="{C20E4C86-7EC0-48A8-8967-D5973F2449B1}" type="presOf" srcId="{F66F622A-412F-4159-A10E-C26A5DF6F3F5}" destId="{006B1DC9-5698-4509-ACB1-F27B63B0B404}" srcOrd="0" destOrd="0" presId="urn:microsoft.com/office/officeart/2005/8/layout/process1"/>
+    <dgm:cxn modelId="{6766F527-9929-49E3-89FE-6A742C435E40}" type="presOf" srcId="{096B117D-CFAE-4B97-B577-A848A7EE76E9}" destId="{FA8A8BDD-6F30-4D81-89FE-62C1361DE394}" srcOrd="0" destOrd="1" presId="urn:microsoft.com/office/officeart/2005/8/layout/process1"/>
+    <dgm:cxn modelId="{45901C6F-5BD7-49F4-BEE9-42F5015847F0}" srcId="{96393E70-71DE-40EB-BEF4-3C87355EF1C7}" destId="{63FF2AAD-0838-47E0-B657-444ED940904A}" srcOrd="1" destOrd="0" parTransId="{062C9E30-2225-481D-BB16-53C00659E0F0}" sibTransId="{09DCC3D8-B33C-4F17-B771-1664E019AB7C}"/>
+    <dgm:cxn modelId="{784D0174-0C59-46A1-B38E-45DFEED384F6}" type="presOf" srcId="{425719E3-B422-477E-B4C0-CCEA11E31F91}" destId="{72C415BA-6BB3-4B68-AB13-AF863FA098DC}" srcOrd="0" destOrd="0" presId="urn:microsoft.com/office/officeart/2005/8/layout/process1"/>
+    <dgm:cxn modelId="{6A564199-8E19-4A8E-AC3E-85C87DADB98E}" type="presOf" srcId="{036CC96A-EA18-40C4-95F6-113799A33A01}" destId="{4FE70845-0908-4593-BC16-BD9F265E4E09}" srcOrd="0" destOrd="0" presId="urn:microsoft.com/office/officeart/2005/8/layout/process1"/>
+    <dgm:cxn modelId="{A8A6BB1C-71A2-4F25-B4CD-9A64CD799AC4}" srcId="{F66F622A-412F-4159-A10E-C26A5DF6F3F5}" destId="{5BCC5825-0A2E-4168-A6B1-4EAE70E6B9F4}" srcOrd="2" destOrd="0" parTransId="{EEE172ED-1847-401B-AD8F-5F9A6845B98D}" sibTransId="{228C745E-EE78-4B30-BFBE-B83EF82FB524}"/>
+    <dgm:cxn modelId="{4F589BE5-1FDB-4D47-A116-790D39478F99}" type="presOf" srcId="{63FF2AAD-0838-47E0-B657-444ED940904A}" destId="{67E5ABC1-15D0-4E7D-9A3F-ABABE7B1EE43}" srcOrd="0" destOrd="2" presId="urn:microsoft.com/office/officeart/2005/8/layout/process1"/>
+    <dgm:cxn modelId="{9A4DD52A-BC1D-4860-A5A2-B9EA2AF3F35B}" type="presOf" srcId="{8B30C927-60A0-48AE-B93C-8AC049F940C5}" destId="{EDA6F320-6716-47C5-ABFC-4D7C47D97B83}" srcOrd="0" destOrd="0" presId="urn:microsoft.com/office/officeart/2005/8/layout/process1"/>
+    <dgm:cxn modelId="{06F71033-881B-4A08-A950-EEB51575188F}" type="presOf" srcId="{228C745E-EE78-4B30-BFBE-B83EF82FB524}" destId="{D422830F-F9F1-4BF0-BD8B-F2698E1990C4}" srcOrd="1" destOrd="0" presId="urn:microsoft.com/office/officeart/2005/8/layout/process1"/>
+    <dgm:cxn modelId="{D04330E7-20DC-44EC-9369-4D27934C9CFD}" type="presOf" srcId="{228C745E-EE78-4B30-BFBE-B83EF82FB524}" destId="{9D638717-3283-4FDF-BAF0-591A24424E8A}" srcOrd="0" destOrd="0" presId="urn:microsoft.com/office/officeart/2005/8/layout/process1"/>
+    <dgm:cxn modelId="{50F7FA5F-285C-44C3-9571-19563B0CE9B5}" type="presOf" srcId="{1EDBC1C5-57DC-4614-86DC-64AF93079E2E}" destId="{FA8A8BDD-6F30-4D81-89FE-62C1361DE394}" srcOrd="0" destOrd="0" presId="urn:microsoft.com/office/officeart/2005/8/layout/process1"/>
+    <dgm:cxn modelId="{EEBA5A65-6732-4A9A-B3CE-507E6B178620}" srcId="{96393E70-71DE-40EB-BEF4-3C87355EF1C7}" destId="{84AA71C9-DFA2-4A99-BBCD-FD50D41AE8DC}" srcOrd="2" destOrd="0" parTransId="{9031A0E3-0868-49D5-9E00-17ABE03C0029}" sibTransId="{D4383FC8-7751-4330-90D6-1C0E22D22974}"/>
     <dgm:cxn modelId="{9CF95C89-03C3-48A3-8AE2-3F0C6334E3E3}" type="presOf" srcId="{5BCC5825-0A2E-4168-A6B1-4EAE70E6B9F4}" destId="{134A918B-C11C-49B8-8C69-3920F9DBB046}" srcOrd="0" destOrd="0" presId="urn:microsoft.com/office/officeart/2005/8/layout/process1"/>
-    <dgm:cxn modelId="{06F71033-881B-4A08-A950-EEB51575188F}" type="presOf" srcId="{228C745E-EE78-4B30-BFBE-B83EF82FB524}" destId="{D422830F-F9F1-4BF0-BD8B-F2698E1990C4}" srcOrd="1" destOrd="0" presId="urn:microsoft.com/office/officeart/2005/8/layout/process1"/>
-    <dgm:cxn modelId="{833D5304-056E-4393-8D92-F6B60915F157}" srcId="{F66F622A-412F-4159-A10E-C26A5DF6F3F5}" destId="{1EDBC1C5-57DC-4614-86DC-64AF93079E2E}" srcOrd="0" destOrd="0" parTransId="{2DE2BB77-32E4-435A-BBFF-8A104098B905}" sibTransId="{425719E3-B422-477E-B4C0-CCEA11E31F91}"/>
-    <dgm:cxn modelId="{9A4DD52A-BC1D-4860-A5A2-B9EA2AF3F35B}" type="presOf" srcId="{8B30C927-60A0-48AE-B93C-8AC049F940C5}" destId="{EDA6F320-6716-47C5-ABFC-4D7C47D97B83}" srcOrd="0" destOrd="0" presId="urn:microsoft.com/office/officeart/2005/8/layout/process1"/>
-    <dgm:cxn modelId="{C5966972-D659-4572-BA0A-1BE21AC48E8B}" type="presOf" srcId="{FCCD0AAB-B0A6-4827-8641-7466DB8EEDDF}" destId="{134A918B-C11C-49B8-8C69-3920F9DBB046}" srcOrd="0" destOrd="1" presId="urn:microsoft.com/office/officeart/2005/8/layout/process1"/>
-    <dgm:cxn modelId="{4F589BE5-1FDB-4D47-A116-790D39478F99}" type="presOf" srcId="{63FF2AAD-0838-47E0-B657-444ED940904A}" destId="{67E5ABC1-15D0-4E7D-9A3F-ABABE7B1EE43}" srcOrd="0" destOrd="2" presId="urn:microsoft.com/office/officeart/2005/8/layout/process1"/>
-    <dgm:cxn modelId="{AB95409D-7E50-4B22-858E-AD32BFA18EE1}" srcId="{1EDBC1C5-57DC-4614-86DC-64AF93079E2E}" destId="{096B117D-CFAE-4B97-B577-A848A7EE76E9}" srcOrd="0" destOrd="0" parTransId="{76992C34-60FD-4CB7-9701-FAF883758CD7}" sibTransId="{5683E833-DAED-4442-8A66-737E6E480BD0}"/>
-    <dgm:cxn modelId="{57063810-672A-467A-A1FE-4DBF81CD0DC5}" type="presOf" srcId="{9736F69C-3F93-47E9-B3A9-30A026D79F48}" destId="{67E5ABC1-15D0-4E7D-9A3F-ABABE7B1EE43}" srcOrd="0" destOrd="1" presId="urn:microsoft.com/office/officeart/2005/8/layout/process1"/>
-    <dgm:cxn modelId="{CD2A88E2-F27D-4F6B-B18A-08E97B885332}" srcId="{F66F622A-412F-4159-A10E-C26A5DF6F3F5}" destId="{96393E70-71DE-40EB-BEF4-3C87355EF1C7}" srcOrd="1" destOrd="0" parTransId="{F1BD0063-44E9-432C-82F3-783DAA7A16D0}" sibTransId="{036CC96A-EA18-40C4-95F6-113799A33A01}"/>
-    <dgm:cxn modelId="{C20E4C86-7EC0-48A8-8967-D5973F2449B1}" type="presOf" srcId="{F66F622A-412F-4159-A10E-C26A5DF6F3F5}" destId="{006B1DC9-5698-4509-ACB1-F27B63B0B404}" srcOrd="0" destOrd="0" presId="urn:microsoft.com/office/officeart/2005/8/layout/process1"/>
-    <dgm:cxn modelId="{627033AB-AB92-43A4-9439-AA4B322978F3}" srcId="{8B30C927-60A0-48AE-B93C-8AC049F940C5}" destId="{2A28C605-9ED8-460C-818C-DF68FB864511}" srcOrd="0" destOrd="0" parTransId="{504F7B9D-E9ED-41E7-9355-D07F80C9CA3C}" sibTransId="{63FC1D30-1987-427A-9363-5611BA175B93}"/>
-    <dgm:cxn modelId="{784D0174-0C59-46A1-B38E-45DFEED384F6}" type="presOf" srcId="{425719E3-B422-477E-B4C0-CCEA11E31F91}" destId="{72C415BA-6BB3-4B68-AB13-AF863FA098DC}" srcOrd="0" destOrd="0" presId="urn:microsoft.com/office/officeart/2005/8/layout/process1"/>
-    <dgm:cxn modelId="{25FE3E61-D4DB-4A0A-9F9F-4477F991347B}" srcId="{5BCC5825-0A2E-4168-A6B1-4EAE70E6B9F4}" destId="{8ADB99C1-AF2F-4EE6-8A4F-60E301AB5D85}" srcOrd="2" destOrd="0" parTransId="{C5C6B2F6-4C52-4208-A8E9-33220813A0C3}" sibTransId="{2F647334-3C04-4E83-B937-02FDD1EC07D2}"/>
-    <dgm:cxn modelId="{CB92A82F-839F-4945-AE5C-3ECA8FD6A9CE}" type="presOf" srcId="{036CC96A-EA18-40C4-95F6-113799A33A01}" destId="{5FF2F506-4D9D-46F8-8FBB-4D2AB962D6A6}" srcOrd="1" destOrd="0" presId="urn:microsoft.com/office/officeart/2005/8/layout/process1"/>
-    <dgm:cxn modelId="{F11AA28E-AAD2-430A-B198-54F2849EB9ED}" srcId="{5BCC5825-0A2E-4168-A6B1-4EAE70E6B9F4}" destId="{137A53C6-D15D-4424-B0A7-0007ABC23E37}" srcOrd="1" destOrd="0" parTransId="{F9BB8056-68AB-492C-9BDF-A575AB95445E}" sibTransId="{21C91749-A901-47F6-80C7-3A9412B61DE6}"/>
-    <dgm:cxn modelId="{40DD65F3-16F8-4934-8FC7-4F0B1D7F9764}" type="presOf" srcId="{137A53C6-D15D-4424-B0A7-0007ABC23E37}" destId="{134A918B-C11C-49B8-8C69-3920F9DBB046}" srcOrd="0" destOrd="2" presId="urn:microsoft.com/office/officeart/2005/8/layout/process1"/>
-    <dgm:cxn modelId="{F32A4FEA-432B-4A31-8A80-20506EE2ACF4}" srcId="{F66F622A-412F-4159-A10E-C26A5DF6F3F5}" destId="{8B30C927-60A0-48AE-B93C-8AC049F940C5}" srcOrd="3" destOrd="0" parTransId="{685D3872-34CC-4FDC-AB60-1DFC260A3206}" sibTransId="{70A345BF-9B9F-45F2-B5D6-B08373C132FF}"/>
-    <dgm:cxn modelId="{50F7FA5F-285C-44C3-9571-19563B0CE9B5}" type="presOf" srcId="{1EDBC1C5-57DC-4614-86DC-64AF93079E2E}" destId="{FA8A8BDD-6F30-4D81-89FE-62C1361DE394}" srcOrd="0" destOrd="0" presId="urn:microsoft.com/office/officeart/2005/8/layout/process1"/>
-    <dgm:cxn modelId="{B094D6E8-62AB-477C-A316-9276314925B8}" type="presOf" srcId="{84AA71C9-DFA2-4A99-BBCD-FD50D41AE8DC}" destId="{67E5ABC1-15D0-4E7D-9A3F-ABABE7B1EE43}" srcOrd="0" destOrd="3" presId="urn:microsoft.com/office/officeart/2005/8/layout/process1"/>
-    <dgm:cxn modelId="{A4AF87A0-CAE7-4717-90C1-B2412A750EAE}" type="presOf" srcId="{2A28C605-9ED8-460C-818C-DF68FB864511}" destId="{EDA6F320-6716-47C5-ABFC-4D7C47D97B83}" srcOrd="0" destOrd="1" presId="urn:microsoft.com/office/officeart/2005/8/layout/process1"/>
-    <dgm:cxn modelId="{84B180F1-FAB1-46A0-8F3F-FA857B79D1A2}" srcId="{96393E70-71DE-40EB-BEF4-3C87355EF1C7}" destId="{9736F69C-3F93-47E9-B3A9-30A026D79F48}" srcOrd="0" destOrd="0" parTransId="{8A65CFFD-8BAA-4AEE-AA9E-2A4C75925C2D}" sibTransId="{10EF2364-0FDE-4F09-BFBC-91BF0E9322D5}"/>
-    <dgm:cxn modelId="{EEBA5A65-6732-4A9A-B3CE-507E6B178620}" srcId="{96393E70-71DE-40EB-BEF4-3C87355EF1C7}" destId="{84AA71C9-DFA2-4A99-BBCD-FD50D41AE8DC}" srcOrd="2" destOrd="0" parTransId="{9031A0E3-0868-49D5-9E00-17ABE03C0029}" sibTransId="{D4383FC8-7751-4330-90D6-1C0E22D22974}"/>
-    <dgm:cxn modelId="{ED55B44E-7909-42FE-8543-3D40F6A08AA9}" srcId="{5BCC5825-0A2E-4168-A6B1-4EAE70E6B9F4}" destId="{FCCD0AAB-B0A6-4827-8641-7466DB8EEDDF}" srcOrd="0" destOrd="0" parTransId="{F6F77263-5240-4983-998B-58F84BB76F60}" sibTransId="{715512A7-D065-457D-B4BC-2F56998656BD}"/>
-    <dgm:cxn modelId="{6A564199-8E19-4A8E-AC3E-85C87DADB98E}" type="presOf" srcId="{036CC96A-EA18-40C4-95F6-113799A33A01}" destId="{4FE70845-0908-4593-BC16-BD9F265E4E09}" srcOrd="0" destOrd="0" presId="urn:microsoft.com/office/officeart/2005/8/layout/process1"/>
-    <dgm:cxn modelId="{6766F527-9929-49E3-89FE-6A742C435E40}" type="presOf" srcId="{096B117D-CFAE-4B97-B577-A848A7EE76E9}" destId="{FA8A8BDD-6F30-4D81-89FE-62C1361DE394}" srcOrd="0" destOrd="1" presId="urn:microsoft.com/office/officeart/2005/8/layout/process1"/>
-    <dgm:cxn modelId="{D1918E8A-76A1-4224-A5D7-6CD5E9EFAC4A}" type="presOf" srcId="{8ADB99C1-AF2F-4EE6-8A4F-60E301AB5D85}" destId="{134A918B-C11C-49B8-8C69-3920F9DBB046}" srcOrd="0" destOrd="3" presId="urn:microsoft.com/office/officeart/2005/8/layout/process1"/>
-    <dgm:cxn modelId="{D04330E7-20DC-44EC-9369-4D27934C9CFD}" type="presOf" srcId="{228C745E-EE78-4B30-BFBE-B83EF82FB524}" destId="{9D638717-3283-4FDF-BAF0-591A24424E8A}" srcOrd="0" destOrd="0" presId="urn:microsoft.com/office/officeart/2005/8/layout/process1"/>
-    <dgm:cxn modelId="{A8A6BB1C-71A2-4F25-B4CD-9A64CD799AC4}" srcId="{F66F622A-412F-4159-A10E-C26A5DF6F3F5}" destId="{5BCC5825-0A2E-4168-A6B1-4EAE70E6B9F4}" srcOrd="2" destOrd="0" parTransId="{EEE172ED-1847-401B-AD8F-5F9A6845B98D}" sibTransId="{228C745E-EE78-4B30-BFBE-B83EF82FB524}"/>
-    <dgm:cxn modelId="{45901C6F-5BD7-49F4-BEE9-42F5015847F0}" srcId="{96393E70-71DE-40EB-BEF4-3C87355EF1C7}" destId="{63FF2AAD-0838-47E0-B657-444ED940904A}" srcOrd="1" destOrd="0" parTransId="{062C9E30-2225-481D-BB16-53C00659E0F0}" sibTransId="{09DCC3D8-B33C-4F17-B771-1664E019AB7C}"/>
     <dgm:cxn modelId="{1E2EC55C-9D8C-4D32-9ABF-8642C3B32DF4}" type="presParOf" srcId="{006B1DC9-5698-4509-ACB1-F27B63B0B404}" destId="{FA8A8BDD-6F30-4D81-89FE-62C1361DE394}" srcOrd="0" destOrd="0" presId="urn:microsoft.com/office/officeart/2005/8/layout/process1"/>
     <dgm:cxn modelId="{DDD77A2E-B855-45B4-8AB6-CA115F3C416E}" type="presParOf" srcId="{006B1DC9-5698-4509-ACB1-F27B63B0B404}" destId="{72C415BA-6BB3-4B68-AB13-AF863FA098DC}" srcOrd="1" destOrd="0" presId="urn:microsoft.com/office/officeart/2005/8/layout/process1"/>
     <dgm:cxn modelId="{857F61D9-4FF5-40FB-8307-0EDB1E440E61}" type="presParOf" srcId="{72C415BA-6BB3-4B68-AB13-AF863FA098DC}" destId="{84221EE1-7805-497C-BBCB-B12F0CF8450D}" srcOrd="0" destOrd="0" presId="urn:microsoft.com/office/officeart/2005/8/layout/process1"/>
@@ -16342,7 +16546,8 @@
           <a:p>
             <a:fld id="{0DA4C790-2F37-460D-9A10-574228979325}" type="datetimeFigureOut">
               <a:rPr lang="de-DE" smtClean="0"/>
-              <a:t>15.07.2009</a:t>
+              <a:pPr/>
+              <a:t>16.07.2009</a:t>
             </a:fld>
             <a:endParaRPr lang="de-DE"/>
           </a:p>
@@ -16503,6 +16708,7 @@
           <a:p>
             <a:fld id="{8FC38991-BB6B-42C1-9213-9F63ACF65AB4}" type="slidenum">
               <a:rPr lang="de-DE" smtClean="0"/>
+              <a:pPr/>
               <a:t>‹Nr.›</a:t>
             </a:fld>
             <a:endParaRPr lang="de-DE"/>
@@ -16788,7 +16994,8 @@
           <a:p>
             <a:fld id="{2F1F7235-DDB4-4E1A-A9D5-767333722F31}" type="datetimeFigureOut">
               <a:rPr lang="de-DE" smtClean="0"/>
-              <a:t>15.07.2009</a:t>
+              <a:pPr/>
+              <a:t>16.07.2009</a:t>
             </a:fld>
             <a:endParaRPr lang="de-DE"/>
           </a:p>
@@ -16830,6 +17037,7 @@
           <a:p>
             <a:fld id="{69793B8F-63D6-44EF-A267-6111CD4F40AB}" type="slidenum">
               <a:rPr lang="de-DE" smtClean="0"/>
+              <a:pPr/>
               <a:t>‹Nr.›</a:t>
             </a:fld>
             <a:endParaRPr lang="de-DE"/>
@@ -16953,7 +17161,8 @@
           <a:p>
             <a:fld id="{2F1F7235-DDB4-4E1A-A9D5-767333722F31}" type="datetimeFigureOut">
               <a:rPr lang="de-DE" smtClean="0"/>
-              <a:t>15.07.2009</a:t>
+              <a:pPr/>
+              <a:t>16.07.2009</a:t>
             </a:fld>
             <a:endParaRPr lang="de-DE"/>
           </a:p>
@@ -16995,6 +17204,7 @@
           <a:p>
             <a:fld id="{69793B8F-63D6-44EF-A267-6111CD4F40AB}" type="slidenum">
               <a:rPr lang="de-DE" smtClean="0"/>
+              <a:pPr/>
               <a:t>‹Nr.›</a:t>
             </a:fld>
             <a:endParaRPr lang="de-DE"/>
@@ -17128,7 +17338,8 @@
           <a:p>
             <a:fld id="{2F1F7235-DDB4-4E1A-A9D5-767333722F31}" type="datetimeFigureOut">
               <a:rPr lang="de-DE" smtClean="0"/>
-              <a:t>15.07.2009</a:t>
+              <a:pPr/>
+              <a:t>16.07.2009</a:t>
             </a:fld>
             <a:endParaRPr lang="de-DE"/>
           </a:p>
@@ -17170,6 +17381,7 @@
           <a:p>
             <a:fld id="{69793B8F-63D6-44EF-A267-6111CD4F40AB}" type="slidenum">
               <a:rPr lang="de-DE" smtClean="0"/>
+              <a:pPr/>
               <a:t>‹Nr.›</a:t>
             </a:fld>
             <a:endParaRPr lang="de-DE"/>
@@ -17293,7 +17505,8 @@
           <a:p>
             <a:fld id="{2F1F7235-DDB4-4E1A-A9D5-767333722F31}" type="datetimeFigureOut">
               <a:rPr lang="de-DE" smtClean="0"/>
-              <a:t>15.07.2009</a:t>
+              <a:pPr/>
+              <a:t>16.07.2009</a:t>
             </a:fld>
             <a:endParaRPr lang="de-DE"/>
           </a:p>
@@ -17335,6 +17548,7 @@
           <a:p>
             <a:fld id="{69793B8F-63D6-44EF-A267-6111CD4F40AB}" type="slidenum">
               <a:rPr lang="de-DE" smtClean="0"/>
+              <a:pPr/>
               <a:t>‹Nr.›</a:t>
             </a:fld>
             <a:endParaRPr lang="de-DE"/>
@@ -17534,7 +17748,8 @@
           <a:p>
             <a:fld id="{2F1F7235-DDB4-4E1A-A9D5-767333722F31}" type="datetimeFigureOut">
               <a:rPr lang="de-DE" smtClean="0"/>
-              <a:t>15.07.2009</a:t>
+              <a:pPr/>
+              <a:t>16.07.2009</a:t>
             </a:fld>
             <a:endParaRPr lang="de-DE"/>
           </a:p>
@@ -17576,6 +17791,7 @@
           <a:p>
             <a:fld id="{69793B8F-63D6-44EF-A267-6111CD4F40AB}" type="slidenum">
               <a:rPr lang="de-DE" smtClean="0"/>
+              <a:pPr/>
               <a:t>‹Nr.›</a:t>
             </a:fld>
             <a:endParaRPr lang="de-DE"/>
@@ -17817,7 +18033,8 @@
           <a:p>
             <a:fld id="{2F1F7235-DDB4-4E1A-A9D5-767333722F31}" type="datetimeFigureOut">
               <a:rPr lang="de-DE" smtClean="0"/>
-              <a:t>15.07.2009</a:t>
+              <a:pPr/>
+              <a:t>16.07.2009</a:t>
             </a:fld>
             <a:endParaRPr lang="de-DE"/>
           </a:p>
@@ -17859,6 +18076,7 @@
           <a:p>
             <a:fld id="{69793B8F-63D6-44EF-A267-6111CD4F40AB}" type="slidenum">
               <a:rPr lang="de-DE" smtClean="0"/>
+              <a:pPr/>
               <a:t>‹Nr.›</a:t>
             </a:fld>
             <a:endParaRPr lang="de-DE"/>
@@ -18234,7 +18452,8 @@
           <a:p>
             <a:fld id="{2F1F7235-DDB4-4E1A-A9D5-767333722F31}" type="datetimeFigureOut">
               <a:rPr lang="de-DE" smtClean="0"/>
-              <a:t>15.07.2009</a:t>
+              <a:pPr/>
+              <a:t>16.07.2009</a:t>
             </a:fld>
             <a:endParaRPr lang="de-DE"/>
           </a:p>
@@ -18276,6 +18495,7 @@
           <a:p>
             <a:fld id="{69793B8F-63D6-44EF-A267-6111CD4F40AB}" type="slidenum">
               <a:rPr lang="de-DE" smtClean="0"/>
+              <a:pPr/>
               <a:t>‹Nr.›</a:t>
             </a:fld>
             <a:endParaRPr lang="de-DE"/>
@@ -18347,7 +18567,8 @@
           <a:p>
             <a:fld id="{2F1F7235-DDB4-4E1A-A9D5-767333722F31}" type="datetimeFigureOut">
               <a:rPr lang="de-DE" smtClean="0"/>
-              <a:t>15.07.2009</a:t>
+              <a:pPr/>
+              <a:t>16.07.2009</a:t>
             </a:fld>
             <a:endParaRPr lang="de-DE"/>
           </a:p>
@@ -18389,6 +18610,7 @@
           <a:p>
             <a:fld id="{69793B8F-63D6-44EF-A267-6111CD4F40AB}" type="slidenum">
               <a:rPr lang="de-DE" smtClean="0"/>
+              <a:pPr/>
               <a:t>‹Nr.›</a:t>
             </a:fld>
             <a:endParaRPr lang="de-DE"/>
@@ -18437,7 +18659,8 @@
           <a:p>
             <a:fld id="{2F1F7235-DDB4-4E1A-A9D5-767333722F31}" type="datetimeFigureOut">
               <a:rPr lang="de-DE" smtClean="0"/>
-              <a:t>15.07.2009</a:t>
+              <a:pPr/>
+              <a:t>16.07.2009</a:t>
             </a:fld>
             <a:endParaRPr lang="de-DE"/>
           </a:p>
@@ -18479,6 +18702,7 @@
           <a:p>
             <a:fld id="{69793B8F-63D6-44EF-A267-6111CD4F40AB}" type="slidenum">
               <a:rPr lang="de-DE" smtClean="0"/>
+              <a:pPr/>
               <a:t>‹Nr.›</a:t>
             </a:fld>
             <a:endParaRPr lang="de-DE"/>
@@ -18709,7 +18933,8 @@
           <a:p>
             <a:fld id="{2F1F7235-DDB4-4E1A-A9D5-767333722F31}" type="datetimeFigureOut">
               <a:rPr lang="de-DE" smtClean="0"/>
-              <a:t>15.07.2009</a:t>
+              <a:pPr/>
+              <a:t>16.07.2009</a:t>
             </a:fld>
             <a:endParaRPr lang="de-DE"/>
           </a:p>
@@ -18751,6 +18976,7 @@
           <a:p>
             <a:fld id="{69793B8F-63D6-44EF-A267-6111CD4F40AB}" type="slidenum">
               <a:rPr lang="de-DE" smtClean="0"/>
+              <a:pPr/>
               <a:t>‹Nr.›</a:t>
             </a:fld>
             <a:endParaRPr lang="de-DE"/>
@@ -18957,7 +19183,8 @@
           <a:p>
             <a:fld id="{2F1F7235-DDB4-4E1A-A9D5-767333722F31}" type="datetimeFigureOut">
               <a:rPr lang="de-DE" smtClean="0"/>
-              <a:t>15.07.2009</a:t>
+              <a:pPr/>
+              <a:t>16.07.2009</a:t>
             </a:fld>
             <a:endParaRPr lang="de-DE"/>
           </a:p>
@@ -18999,6 +19226,7 @@
           <a:p>
             <a:fld id="{69793B8F-63D6-44EF-A267-6111CD4F40AB}" type="slidenum">
               <a:rPr lang="de-DE" smtClean="0"/>
+              <a:pPr/>
               <a:t>‹Nr.›</a:t>
             </a:fld>
             <a:endParaRPr lang="de-DE"/>
@@ -19165,7 +19393,8 @@
           <a:p>
             <a:fld id="{2F1F7235-DDB4-4E1A-A9D5-767333722F31}" type="datetimeFigureOut">
               <a:rPr lang="de-DE" smtClean="0"/>
-              <a:t>15.07.2009</a:t>
+              <a:pPr/>
+              <a:t>16.07.2009</a:t>
             </a:fld>
             <a:endParaRPr lang="de-DE"/>
           </a:p>
@@ -19243,6 +19472,7 @@
           <a:p>
             <a:fld id="{69793B8F-63D6-44EF-A267-6111CD4F40AB}" type="slidenum">
               <a:rPr lang="de-DE" smtClean="0"/>
+              <a:pPr/>
               <a:t>‹Nr.›</a:t>
             </a:fld>
             <a:endParaRPr lang="de-DE"/>
@@ -19864,6 +20094,82 @@
           <a:p>
             <a:r>
               <a:rPr lang="de-DE" dirty="0" smtClean="0"/>
+              <a:t>Laden eines Mitschnitts (Replay)</a:t>
+            </a:r>
+            <a:endParaRPr lang="de-DE" dirty="0"/>
+          </a:p>
+        </p:txBody>
+      </p:sp>
+      <p:pic>
+        <p:nvPicPr>
+          <p:cNvPr id="1026" name="Picture 2" descr="C:\Users\Marcel\Documents\loadReplay.png"/>
+          <p:cNvPicPr>
+            <a:picLocks noGrp="1" noChangeAspect="1" noChangeArrowheads="1"/>
+          </p:cNvPicPr>
+          <p:nvPr>
+            <p:ph idx="1"/>
+          </p:nvPr>
+        </p:nvPicPr>
+        <p:blipFill>
+          <a:blip r:embed="rId2" cstate="print"/>
+          <a:srcRect/>
+          <a:stretch>
+            <a:fillRect/>
+          </a:stretch>
+        </p:blipFill>
+        <p:spPr bwMode="auto">
+          <a:xfrm>
+            <a:off x="1426974" y="1600200"/>
+            <a:ext cx="6290051" cy="4525963"/>
+          </a:xfrm>
+          <a:prstGeom prst="rect">
+            <a:avLst/>
+          </a:prstGeom>
+          <a:noFill/>
+        </p:spPr>
+      </p:pic>
+    </p:spTree>
+  </p:cSld>
+  <p:clrMapOvr>
+    <a:masterClrMapping/>
+  </p:clrMapOvr>
+</p:sld>
+</file>
+
+<file path=ppt/slides/slide14.xml><?xml version="1.0" encoding="utf-8"?>
+<p:sld xmlns:a="http://schemas.openxmlformats.org/drawingml/2006/main" xmlns:r="http://schemas.openxmlformats.org/officeDocument/2006/relationships" xmlns:p="http://schemas.openxmlformats.org/presentationml/2006/main">
+  <p:cSld>
+    <p:spTree>
+      <p:nvGrpSpPr>
+        <p:cNvPr id="1" name=""/>
+        <p:cNvGrpSpPr/>
+        <p:nvPr/>
+      </p:nvGrpSpPr>
+      <p:grpSpPr>
+        <a:xfrm>
+          <a:off x="0" y="0"/>
+          <a:ext cx="0" cy="0"/>
+          <a:chOff x="0" y="0"/>
+          <a:chExt cx="0" cy="0"/>
+        </a:xfrm>
+      </p:grpSpPr>
+      <p:sp>
+        <p:nvSpPr>
+          <p:cNvPr id="2" name="Titel 1"/>
+          <p:cNvSpPr>
+            <a:spLocks noGrp="1"/>
+          </p:cNvSpPr>
+          <p:nvPr>
+            <p:ph type="title"/>
+          </p:nvPr>
+        </p:nvSpPr>
+        <p:spPr/>
+        <p:txBody>
+          <a:bodyPr/>
+          <a:lstStyle/>
+          <a:p>
+            <a:r>
+              <a:rPr lang="de-DE" dirty="0" smtClean="0"/>
               <a:t>GUI (ohne Spiel)</a:t>
             </a:r>
             <a:endParaRPr lang="de-DE" dirty="0"/>
@@ -19912,77 +20218,6 @@
 </p:sld>
 </file>
 
-<file path=ppt/slides/slide14.xml><?xml version="1.0" encoding="utf-8"?>
-<p:sld xmlns:a="http://schemas.openxmlformats.org/drawingml/2006/main" xmlns:r="http://schemas.openxmlformats.org/officeDocument/2006/relationships" xmlns:p="http://schemas.openxmlformats.org/presentationml/2006/main">
-  <p:cSld>
-    <p:spTree>
-      <p:nvGrpSpPr>
-        <p:cNvPr id="1" name=""/>
-        <p:cNvGrpSpPr/>
-        <p:nvPr/>
-      </p:nvGrpSpPr>
-      <p:grpSpPr>
-        <a:xfrm>
-          <a:off x="0" y="0"/>
-          <a:ext cx="0" cy="0"/>
-          <a:chOff x="0" y="0"/>
-          <a:chExt cx="0" cy="0"/>
-        </a:xfrm>
-      </p:grpSpPr>
-      <p:sp>
-        <p:nvSpPr>
-          <p:cNvPr id="4" name="Titel 3"/>
-          <p:cNvSpPr>
-            <a:spLocks noGrp="1"/>
-          </p:cNvSpPr>
-          <p:nvPr>
-            <p:ph type="title"/>
-          </p:nvPr>
-        </p:nvSpPr>
-        <p:spPr/>
-        <p:txBody>
-          <a:bodyPr/>
-          <a:lstStyle/>
-          <a:p>
-            <a:r>
-              <a:rPr lang="de-DE" dirty="0" smtClean="0"/>
-              <a:t>„Hase und Igel“ Plugin (GUI)</a:t>
-            </a:r>
-            <a:endParaRPr lang="de-DE" dirty="0"/>
-          </a:p>
-        </p:txBody>
-      </p:sp>
-      <p:sp>
-        <p:nvSpPr>
-          <p:cNvPr id="5" name="Textplatzhalter 4"/>
-          <p:cNvSpPr>
-            <a:spLocks noGrp="1"/>
-          </p:cNvSpPr>
-          <p:nvPr>
-            <p:ph type="body" idx="1"/>
-          </p:nvPr>
-        </p:nvSpPr>
-        <p:spPr/>
-        <p:txBody>
-          <a:bodyPr/>
-          <a:lstStyle/>
-          <a:p>
-            <a:r>
-              <a:rPr lang="de-DE" dirty="0" smtClean="0"/>
-              <a:t>Als Mensch mitspielen können…</a:t>
-            </a:r>
-            <a:endParaRPr lang="de-DE" dirty="0"/>
-          </a:p>
-        </p:txBody>
-      </p:sp>
-    </p:spTree>
-  </p:cSld>
-  <p:clrMapOvr>
-    <a:masterClrMapping/>
-  </p:clrMapOvr>
-</p:sld>
-</file>
-
 <file path=ppt/slides/slide15.xml><?xml version="1.0" encoding="utf-8"?>
 <p:sld xmlns:a="http://schemas.openxmlformats.org/drawingml/2006/main" xmlns:r="http://schemas.openxmlformats.org/officeDocument/2006/relationships" xmlns:p="http://schemas.openxmlformats.org/presentationml/2006/main">
   <p:cSld>
@@ -20017,6 +20252,77 @@
           <a:p>
             <a:r>
               <a:rPr lang="de-DE" dirty="0" smtClean="0"/>
+              <a:t>„Hase und Igel“ Plugin (GUI)</a:t>
+            </a:r>
+            <a:endParaRPr lang="de-DE" dirty="0"/>
+          </a:p>
+        </p:txBody>
+      </p:sp>
+      <p:sp>
+        <p:nvSpPr>
+          <p:cNvPr id="5" name="Textplatzhalter 4"/>
+          <p:cNvSpPr>
+            <a:spLocks noGrp="1"/>
+          </p:cNvSpPr>
+          <p:nvPr>
+            <p:ph type="body" idx="1"/>
+          </p:nvPr>
+        </p:nvSpPr>
+        <p:spPr/>
+        <p:txBody>
+          <a:bodyPr/>
+          <a:lstStyle/>
+          <a:p>
+            <a:r>
+              <a:rPr lang="de-DE" dirty="0" smtClean="0"/>
+              <a:t>Als Mensch mitspielen können…</a:t>
+            </a:r>
+            <a:endParaRPr lang="de-DE" dirty="0"/>
+          </a:p>
+        </p:txBody>
+      </p:sp>
+    </p:spTree>
+  </p:cSld>
+  <p:clrMapOvr>
+    <a:masterClrMapping/>
+  </p:clrMapOvr>
+</p:sld>
+</file>
+
+<file path=ppt/slides/slide16.xml><?xml version="1.0" encoding="utf-8"?>
+<p:sld xmlns:a="http://schemas.openxmlformats.org/drawingml/2006/main" xmlns:r="http://schemas.openxmlformats.org/officeDocument/2006/relationships" xmlns:p="http://schemas.openxmlformats.org/presentationml/2006/main">
+  <p:cSld>
+    <p:spTree>
+      <p:nvGrpSpPr>
+        <p:cNvPr id="1" name=""/>
+        <p:cNvGrpSpPr/>
+        <p:nvPr/>
+      </p:nvGrpSpPr>
+      <p:grpSpPr>
+        <a:xfrm>
+          <a:off x="0" y="0"/>
+          <a:ext cx="0" cy="0"/>
+          <a:chOff x="0" y="0"/>
+          <a:chExt cx="0" cy="0"/>
+        </a:xfrm>
+      </p:grpSpPr>
+      <p:sp>
+        <p:nvSpPr>
+          <p:cNvPr id="4" name="Titel 3"/>
+          <p:cNvSpPr>
+            <a:spLocks noGrp="1"/>
+          </p:cNvSpPr>
+          <p:nvPr>
+            <p:ph type="title"/>
+          </p:nvPr>
+        </p:nvSpPr>
+        <p:spPr/>
+        <p:txBody>
+          <a:bodyPr/>
+          <a:lstStyle/>
+          <a:p>
+            <a:r>
+              <a:rPr lang="de-DE" dirty="0" smtClean="0"/>
               <a:t>Anforderungen</a:t>
             </a:r>
             <a:endParaRPr lang="de-DE" dirty="0"/>
@@ -20067,7 +20373,7 @@
 </p:sld>
 </file>
 
-<file path=ppt/slides/slide16.xml><?xml version="1.0" encoding="utf-8"?>
+<file path=ppt/slides/slide17.xml><?xml version="1.0" encoding="utf-8"?>
 <p:sld xmlns:a="http://schemas.openxmlformats.org/drawingml/2006/main" xmlns:r="http://schemas.openxmlformats.org/officeDocument/2006/relationships" xmlns:p="http://schemas.openxmlformats.org/presentationml/2006/main">
   <p:cSld>
     <p:spTree>
@@ -20143,7 +20449,7 @@
 </p:sld>
 </file>
 
-<file path=ppt/slides/slide17.xml><?xml version="1.0" encoding="utf-8"?>
+<file path=ppt/slides/slide18.xml><?xml version="1.0" encoding="utf-8"?>
 <p:sld xmlns:a="http://schemas.openxmlformats.org/drawingml/2006/main" xmlns:r="http://schemas.openxmlformats.org/officeDocument/2006/relationships" xmlns:p="http://schemas.openxmlformats.org/presentationml/2006/main">
   <p:cSld>
     <p:spTree>
@@ -20243,7 +20549,7 @@
 </p:sld>
 </file>
 
-<file path=ppt/slides/slide18.xml><?xml version="1.0" encoding="utf-8"?>
+<file path=ppt/slides/slide19.xml><?xml version="1.0" encoding="utf-8"?>
 <p:sld xmlns:a="http://schemas.openxmlformats.org/drawingml/2006/main" xmlns:r="http://schemas.openxmlformats.org/officeDocument/2006/relationships" xmlns:p="http://schemas.openxmlformats.org/presentationml/2006/main">
   <p:cSld>
     <p:spTree>
@@ -20325,77 +20631,6 @@
 </p:sld>
 </file>
 
-<file path=ppt/slides/slide19.xml><?xml version="1.0" encoding="utf-8"?>
-<p:sld xmlns:a="http://schemas.openxmlformats.org/drawingml/2006/main" xmlns:r="http://schemas.openxmlformats.org/officeDocument/2006/relationships" xmlns:p="http://schemas.openxmlformats.org/presentationml/2006/main">
-  <p:cSld>
-    <p:spTree>
-      <p:nvGrpSpPr>
-        <p:cNvPr id="1" name=""/>
-        <p:cNvGrpSpPr/>
-        <p:nvPr/>
-      </p:nvGrpSpPr>
-      <p:grpSpPr>
-        <a:xfrm>
-          <a:off x="0" y="0"/>
-          <a:ext cx="0" cy="0"/>
-          <a:chOff x="0" y="0"/>
-          <a:chExt cx="0" cy="0"/>
-        </a:xfrm>
-      </p:grpSpPr>
-      <p:sp>
-        <p:nvSpPr>
-          <p:cNvPr id="4" name="Titel 3"/>
-          <p:cNvSpPr>
-            <a:spLocks noGrp="1"/>
-          </p:cNvSpPr>
-          <p:nvPr>
-            <p:ph type="title"/>
-          </p:nvPr>
-        </p:nvSpPr>
-        <p:spPr/>
-        <p:txBody>
-          <a:bodyPr/>
-          <a:lstStyle/>
-          <a:p>
-            <a:r>
-              <a:rPr lang="de-DE" dirty="0" smtClean="0"/>
-              <a:t>Der Spiel-Server</a:t>
-            </a:r>
-            <a:endParaRPr lang="de-DE" dirty="0"/>
-          </a:p>
-        </p:txBody>
-      </p:sp>
-      <p:sp>
-        <p:nvSpPr>
-          <p:cNvPr id="5" name="Textplatzhalter 4"/>
-          <p:cNvSpPr>
-            <a:spLocks noGrp="1"/>
-          </p:cNvSpPr>
-          <p:nvPr>
-            <p:ph type="body" idx="1"/>
-          </p:nvPr>
-        </p:nvSpPr>
-        <p:spPr/>
-        <p:txBody>
-          <a:bodyPr/>
-          <a:lstStyle/>
-          <a:p>
-            <a:r>
-              <a:rPr lang="de-DE" dirty="0" smtClean="0"/>
-              <a:t>Die Spiele und ihre Logik laufen hier ab…</a:t>
-            </a:r>
-            <a:endParaRPr lang="de-DE" dirty="0"/>
-          </a:p>
-        </p:txBody>
-      </p:sp>
-    </p:spTree>
-  </p:cSld>
-  <p:clrMapOvr>
-    <a:masterClrMapping/>
-  </p:clrMapOvr>
-</p:sld>
-</file>
-
 <file path=ppt/slides/slide2.xml><?xml version="1.0" encoding="utf-8"?>
 <p:sld xmlns:a="http://schemas.openxmlformats.org/drawingml/2006/main" xmlns:r="http://schemas.openxmlformats.org/officeDocument/2006/relationships" xmlns:p="http://schemas.openxmlformats.org/presentationml/2006/main">
   <p:cSld>
@@ -20462,7 +20697,6 @@
               <a:rPr lang="de-DE" dirty="0" smtClean="0"/>
               <a:t>Ausrichtung von Wettkämpfen</a:t>
             </a:r>
-            <a:endParaRPr lang="de-DE" dirty="0" smtClean="0"/>
           </a:p>
           <a:p>
             <a:pPr lvl="1"/>
@@ -20516,7 +20750,7 @@
       </p:grpSpPr>
       <p:sp>
         <p:nvSpPr>
-          <p:cNvPr id="2" name="Titel 1"/>
+          <p:cNvPr id="4" name="Titel 3"/>
           <p:cNvSpPr>
             <a:spLocks noGrp="1"/>
           </p:cNvSpPr>
@@ -20531,7 +20765,7 @@
           <a:p>
             <a:r>
               <a:rPr lang="de-DE" dirty="0" smtClean="0"/>
-              <a:t>Anwendungsfälle</a:t>
+              <a:t>Der Spiel-Server</a:t>
             </a:r>
             <a:endParaRPr lang="de-DE" dirty="0"/>
           </a:p>
@@ -20539,12 +20773,12 @@
       </p:sp>
       <p:sp>
         <p:nvSpPr>
-          <p:cNvPr id="3" name="Inhaltsplatzhalter 2"/>
+          <p:cNvPr id="5" name="Textplatzhalter 4"/>
           <p:cNvSpPr>
             <a:spLocks noGrp="1"/>
           </p:cNvSpPr>
           <p:nvPr>
-            <p:ph idx="1"/>
+            <p:ph type="body" idx="1"/>
           </p:nvPr>
         </p:nvSpPr>
         <p:spPr/>
@@ -20554,38 +20788,9 @@
           <a:p>
             <a:r>
               <a:rPr lang="de-DE" dirty="0" smtClean="0"/>
-              <a:t>(Verbindung herstellen)</a:t>
-            </a:r>
-          </a:p>
-          <a:p>
-            <a:r>
-              <a:rPr lang="de-DE" dirty="0" smtClean="0"/>
-              <a:t>Begegnung austragen</a:t>
-            </a:r>
-          </a:p>
-          <a:p>
-            <a:r>
-              <a:rPr lang="de-DE" dirty="0" smtClean="0"/>
-              <a:t>Begegnung vorbereiten</a:t>
-            </a:r>
-          </a:p>
-          <a:p>
-            <a:r>
-              <a:rPr lang="de-DE" dirty="0" smtClean="0"/>
-              <a:t>Begegnung administrieren</a:t>
-            </a:r>
-          </a:p>
-          <a:p>
-            <a:r>
-              <a:rPr lang="de-DE" dirty="0" smtClean="0"/>
-              <a:t>Begegnung beobachten</a:t>
-            </a:r>
-          </a:p>
-          <a:p>
-            <a:r>
-              <a:rPr lang="de-DE" dirty="0" smtClean="0"/>
-              <a:t>(Verbindung beenden)</a:t>
-            </a:r>
+              <a:t>Die Spiele und ihre Logik laufen hier ab…</a:t>
+            </a:r>
+            <a:endParaRPr lang="de-DE" dirty="0"/>
           </a:p>
         </p:txBody>
       </p:sp>
@@ -20631,32 +20836,64 @@
           <a:p>
             <a:r>
               <a:rPr lang="de-DE" dirty="0" smtClean="0"/>
-              <a:t>Die Teilnehmer</a:t>
+              <a:t>Anwendungsfälle</a:t>
             </a:r>
             <a:endParaRPr lang="de-DE" dirty="0"/>
           </a:p>
         </p:txBody>
       </p:sp>
-      <p:graphicFrame>
-        <p:nvGraphicFramePr>
-          <p:cNvPr id="4" name="Inhaltsplatzhalter 3"/>
-          <p:cNvGraphicFramePr>
-            <a:graphicFrameLocks noGrp="1"/>
-          </p:cNvGraphicFramePr>
+      <p:sp>
+        <p:nvSpPr>
+          <p:cNvPr id="3" name="Inhaltsplatzhalter 2"/>
+          <p:cNvSpPr>
+            <a:spLocks noGrp="1"/>
+          </p:cNvSpPr>
           <p:nvPr>
             <p:ph idx="1"/>
           </p:nvPr>
-        </p:nvGraphicFramePr>
-        <p:xfrm>
-          <a:off x="457200" y="1600200"/>
-          <a:ext cx="8229600" cy="4525963"/>
-        </p:xfrm>
-        <a:graphic>
-          <a:graphicData uri="http://schemas.openxmlformats.org/drawingml/2006/diagram">
-            <dgm:relIds xmlns:dgm="http://schemas.openxmlformats.org/drawingml/2006/diagram" xmlns:r="http://schemas.openxmlformats.org/officeDocument/2006/relationships" r:dm="rId2" r:lo="rId3" r:qs="rId4" r:cs="rId5"/>
-          </a:graphicData>
-        </a:graphic>
-      </p:graphicFrame>
+        </p:nvSpPr>
+        <p:spPr/>
+        <p:txBody>
+          <a:bodyPr/>
+          <a:lstStyle/>
+          <a:p>
+            <a:r>
+              <a:rPr lang="de-DE" dirty="0" smtClean="0"/>
+              <a:t>(Verbindung herstellen)</a:t>
+            </a:r>
+          </a:p>
+          <a:p>
+            <a:r>
+              <a:rPr lang="de-DE" dirty="0" smtClean="0"/>
+              <a:t>Begegnung austragen</a:t>
+            </a:r>
+          </a:p>
+          <a:p>
+            <a:r>
+              <a:rPr lang="de-DE" dirty="0" smtClean="0"/>
+              <a:t>Begegnung vorbereiten</a:t>
+            </a:r>
+          </a:p>
+          <a:p>
+            <a:r>
+              <a:rPr lang="de-DE" dirty="0" smtClean="0"/>
+              <a:t>Begegnung administrieren</a:t>
+            </a:r>
+          </a:p>
+          <a:p>
+            <a:r>
+              <a:rPr lang="de-DE" dirty="0" smtClean="0"/>
+              <a:t>Begegnung beobachten</a:t>
+            </a:r>
+          </a:p>
+          <a:p>
+            <a:r>
+              <a:rPr lang="de-DE" dirty="0" smtClean="0"/>
+              <a:t>(Verbindung beenden)</a:t>
+            </a:r>
+          </a:p>
+        </p:txBody>
+      </p:sp>
     </p:spTree>
   </p:cSld>
   <p:clrMapOvr>
@@ -20767,7 +21004,7 @@
           <a:p>
             <a:r>
               <a:rPr lang="de-DE" dirty="0" smtClean="0"/>
-              <a:t>Abstraktion</a:t>
+              <a:t>Die Teilnehmer</a:t>
             </a:r>
             <a:endParaRPr lang="de-DE" dirty="0"/>
           </a:p>
@@ -20835,97 +21072,32 @@
           <a:p>
             <a:r>
               <a:rPr lang="de-DE" dirty="0" smtClean="0"/>
-              <a:t>Erweiterbarkeit</a:t>
+              <a:t>Abstraktion</a:t>
             </a:r>
             <a:endParaRPr lang="de-DE" dirty="0"/>
           </a:p>
         </p:txBody>
       </p:sp>
-      <p:sp>
-        <p:nvSpPr>
-          <p:cNvPr id="3" name="Inhaltsplatzhalter 2"/>
-          <p:cNvSpPr>
-            <a:spLocks noGrp="1"/>
-          </p:cNvSpPr>
+      <p:graphicFrame>
+        <p:nvGraphicFramePr>
+          <p:cNvPr id="4" name="Inhaltsplatzhalter 3"/>
+          <p:cNvGraphicFramePr>
+            <a:graphicFrameLocks noGrp="1"/>
+          </p:cNvGraphicFramePr>
           <p:nvPr>
             <p:ph idx="1"/>
           </p:nvPr>
-        </p:nvSpPr>
-        <p:spPr/>
-        <p:txBody>
-          <a:bodyPr>
-            <a:normAutofit fontScale="92500" lnSpcReduction="10000"/>
-          </a:bodyPr>
-          <a:lstStyle/>
-          <a:p>
-            <a:r>
-              <a:rPr lang="de-DE" dirty="0" err="1" smtClean="0"/>
-              <a:t>IGamePlugin</a:t>
-            </a:r>
-            <a:endParaRPr lang="de-DE" dirty="0"/>
-          </a:p>
-          <a:p>
-            <a:pPr lvl="1"/>
-            <a:r>
-              <a:rPr lang="de-DE" dirty="0" smtClean="0"/>
-              <a:t>Definition des Spiels</a:t>
-            </a:r>
-          </a:p>
-          <a:p>
-            <a:pPr lvl="1"/>
-            <a:r>
-              <a:rPr lang="de-DE" dirty="0" smtClean="0"/>
-              <a:t>Kann neue Instanzen erstellen</a:t>
-            </a:r>
-          </a:p>
-          <a:p>
-            <a:r>
-              <a:rPr lang="de-DE" dirty="0" err="1" smtClean="0"/>
-              <a:t>IPauseable</a:t>
-            </a:r>
-            <a:r>
-              <a:rPr lang="de-DE" dirty="0" smtClean="0"/>
-              <a:t> (optional)</a:t>
-            </a:r>
-          </a:p>
-          <a:p>
-            <a:pPr lvl="1"/>
-            <a:r>
-              <a:rPr lang="de-DE" dirty="0" smtClean="0"/>
-              <a:t>Interface zum Pausieren des Spiels</a:t>
-            </a:r>
-          </a:p>
-          <a:p>
-            <a:r>
-              <a:rPr lang="de-DE" dirty="0" err="1" smtClean="0"/>
-              <a:t>IGameInstance</a:t>
-            </a:r>
-            <a:endParaRPr lang="de-DE" dirty="0" smtClean="0"/>
-          </a:p>
-          <a:p>
-            <a:pPr lvl="1"/>
-            <a:r>
-              <a:rPr lang="de-DE" dirty="0" smtClean="0"/>
-              <a:t>Instanz des Spiels</a:t>
-            </a:r>
-          </a:p>
-          <a:p>
-            <a:r>
-              <a:rPr lang="de-DE" dirty="0" err="1" smtClean="0"/>
-              <a:t>IPlayer</a:t>
-            </a:r>
-            <a:endParaRPr lang="de-DE" dirty="0" smtClean="0"/>
-          </a:p>
-          <a:p>
-            <a:pPr lvl="1"/>
-            <a:r>
-              <a:rPr lang="de-DE" dirty="0" smtClean="0"/>
-              <a:t>Eine Spielerinstanz mit dessen Attributen</a:t>
-            </a:r>
-            <a:endParaRPr lang="de-DE" dirty="0"/>
-          </a:p>
-        </p:txBody>
-      </p:sp>
+        </p:nvGraphicFramePr>
+        <p:xfrm>
+          <a:off x="457200" y="1600200"/>
+          <a:ext cx="8229600" cy="4525963"/>
+        </p:xfrm>
+        <a:graphic>
+          <a:graphicData uri="http://schemas.openxmlformats.org/drawingml/2006/diagram">
+            <dgm:relIds xmlns:dgm="http://schemas.openxmlformats.org/drawingml/2006/diagram" xmlns:r="http://schemas.openxmlformats.org/officeDocument/2006/relationships" r:dm="rId2" r:lo="rId3" r:qs="rId4" r:cs="rId5"/>
+          </a:graphicData>
+        </a:graphic>
+      </p:graphicFrame>
     </p:spTree>
   </p:cSld>
   <p:clrMapOvr>
@@ -20967,8 +21139,8 @@
           <a:lstStyle/>
           <a:p>
             <a:r>
-              <a:rPr lang="de-DE" dirty="0" err="1" smtClean="0"/>
-              <a:t>IGamePlugin</a:t>
+              <a:rPr lang="de-DE" dirty="0" smtClean="0"/>
+              <a:t>Erweiterbarkeit</a:t>
             </a:r>
             <a:endParaRPr lang="de-DE" dirty="0"/>
           </a:p>
@@ -20986,18 +21158,49 @@
         </p:nvSpPr>
         <p:spPr/>
         <p:txBody>
-          <a:bodyPr/>
+          <a:bodyPr>
+            <a:normAutofit fontScale="92500" lnSpcReduction="10000"/>
+          </a:bodyPr>
           <a:lstStyle/>
           <a:p>
+            <a:r>
+              <a:rPr lang="de-DE" dirty="0" err="1" smtClean="0"/>
+              <a:t>IGamePlugin</a:t>
+            </a:r>
+            <a:endParaRPr lang="de-DE" dirty="0"/>
+          </a:p>
+          <a:p>
             <a:pPr lvl="1"/>
             <a:r>
+              <a:rPr lang="de-DE" dirty="0" smtClean="0"/>
+              <a:t>Definition des Spiels</a:t>
+            </a:r>
+          </a:p>
+          <a:p>
+            <a:pPr lvl="1"/>
+            <a:r>
+              <a:rPr lang="de-DE" dirty="0" smtClean="0"/>
+              <a:t>Kann neue Instanzen erstellen</a:t>
+            </a:r>
+          </a:p>
+          <a:p>
+            <a:r>
               <a:rPr lang="de-DE" dirty="0" err="1" smtClean="0"/>
-              <a:t>createGame</a:t>
+              <a:t>IPauseable</a:t>
             </a:r>
             <a:r>
               <a:rPr lang="de-DE" dirty="0" smtClean="0"/>
-              <a:t>() : </a:t>
-            </a:r>
+              <a:t> (optional)</a:t>
+            </a:r>
+          </a:p>
+          <a:p>
+            <a:pPr lvl="1"/>
+            <a:r>
+              <a:rPr lang="de-DE" dirty="0" smtClean="0"/>
+              <a:t>Interface zum Pausieren des Spiels</a:t>
+            </a:r>
+          </a:p>
+          <a:p>
             <a:r>
               <a:rPr lang="de-DE" dirty="0" err="1" smtClean="0"/>
               <a:t>IGameInstance</a:t>
@@ -21007,84 +21210,24 @@
           <a:p>
             <a:pPr lvl="1"/>
             <a:r>
+              <a:rPr lang="de-DE" dirty="0" smtClean="0"/>
+              <a:t>Instanz des Spiels</a:t>
+            </a:r>
+          </a:p>
+          <a:p>
+            <a:r>
               <a:rPr lang="de-DE" dirty="0" err="1" smtClean="0"/>
-              <a:t>getMaximumPlayerCount</a:t>
-            </a:r>
+              <a:t>IPlayer</a:t>
+            </a:r>
+            <a:endParaRPr lang="de-DE" dirty="0" smtClean="0"/>
+          </a:p>
+          <a:p>
+            <a:pPr lvl="1"/>
             <a:r>
               <a:rPr lang="de-DE" dirty="0" smtClean="0"/>
-              <a:t>() : </a:t>
-            </a:r>
-            <a:r>
-              <a:rPr lang="de-DE" dirty="0" err="1" smtClean="0"/>
-              <a:t>int</a:t>
-            </a:r>
-            <a:endParaRPr lang="de-DE" dirty="0" smtClean="0"/>
-          </a:p>
-          <a:p>
-            <a:pPr lvl="1"/>
-            <a:r>
-              <a:rPr lang="de-DE" dirty="0" err="1" smtClean="0"/>
-              <a:t>getScoreDefinition</a:t>
-            </a:r>
-            <a:r>
-              <a:rPr lang="de-DE" dirty="0" smtClean="0"/>
-              <a:t>() : </a:t>
-            </a:r>
-            <a:r>
-              <a:rPr lang="de-DE" dirty="0" err="1" smtClean="0"/>
-              <a:t>ScoreDefinition</a:t>
-            </a:r>
-            <a:endParaRPr lang="de-DE" dirty="0" smtClean="0"/>
-          </a:p>
-          <a:p>
-            <a:pPr lvl="1"/>
+              <a:t>Eine Spielerinstanz mit dessen Attributen</a:t>
+            </a:r>
             <a:endParaRPr lang="de-DE" dirty="0"/>
-          </a:p>
-          <a:p>
-            <a:r>
-              <a:rPr lang="de-DE" dirty="0" err="1" smtClean="0"/>
-              <a:t>IPauseable</a:t>
-            </a:r>
-            <a:r>
-              <a:rPr lang="de-DE" dirty="0" smtClean="0"/>
-              <a:t> (Optional)</a:t>
-            </a:r>
-          </a:p>
-          <a:p>
-            <a:pPr lvl="1"/>
-            <a:r>
-              <a:rPr lang="de-DE" dirty="0" err="1" smtClean="0"/>
-              <a:t>setPauseMode</a:t>
-            </a:r>
-            <a:r>
-              <a:rPr lang="de-DE" dirty="0" smtClean="0"/>
-              <a:t>(</a:t>
-            </a:r>
-            <a:r>
-              <a:rPr lang="de-DE" dirty="0" err="1" smtClean="0"/>
-              <a:t>boolean</a:t>
-            </a:r>
-            <a:r>
-              <a:rPr lang="de-DE" dirty="0" smtClean="0"/>
-              <a:t>) : </a:t>
-            </a:r>
-            <a:r>
-              <a:rPr lang="de-DE" dirty="0" err="1" smtClean="0"/>
-              <a:t>void</a:t>
-            </a:r>
-            <a:endParaRPr lang="de-DE" dirty="0" smtClean="0"/>
-          </a:p>
-          <a:p>
-            <a:pPr lvl="1"/>
-            <a:r>
-              <a:rPr lang="de-DE" dirty="0" smtClean="0"/>
-              <a:t>afterPause() : </a:t>
-            </a:r>
-            <a:r>
-              <a:rPr lang="de-DE" dirty="0" err="1" smtClean="0"/>
-              <a:t>void</a:t>
-            </a:r>
-            <a:endParaRPr lang="de-DE" dirty="0" smtClean="0"/>
           </a:p>
         </p:txBody>
       </p:sp>
@@ -21130,7 +21273,7 @@
           <a:p>
             <a:r>
               <a:rPr lang="de-DE" dirty="0" err="1" smtClean="0"/>
-              <a:t>IGameInstance</a:t>
+              <a:t>IGamePlugin</a:t>
             </a:r>
             <a:endParaRPr lang="de-DE" dirty="0"/>
           </a:p>
@@ -21154,7 +21297,7 @@
             <a:pPr lvl="1"/>
             <a:r>
               <a:rPr lang="de-DE" dirty="0" err="1" smtClean="0"/>
-              <a:t>start</a:t>
+              <a:t>createGame</a:t>
             </a:r>
             <a:r>
               <a:rPr lang="de-DE" dirty="0" smtClean="0"/>
@@ -21162,7 +21305,7 @@
             </a:r>
             <a:r>
               <a:rPr lang="de-DE" dirty="0" err="1" smtClean="0"/>
-              <a:t>void</a:t>
+              <a:t>IGameInstance</a:t>
             </a:r>
             <a:endParaRPr lang="de-DE" dirty="0" smtClean="0"/>
           </a:p>
@@ -21170,7 +21313,7 @@
             <a:pPr lvl="1"/>
             <a:r>
               <a:rPr lang="de-DE" dirty="0" err="1" smtClean="0"/>
-              <a:t>ready</a:t>
+              <a:t>getMaximumPlayerCount</a:t>
             </a:r>
             <a:r>
               <a:rPr lang="de-DE" dirty="0" smtClean="0"/>
@@ -21178,7 +21321,7 @@
             </a:r>
             <a:r>
               <a:rPr lang="de-DE" dirty="0" err="1" smtClean="0"/>
-              <a:t>boolean</a:t>
+              <a:t>int</a:t>
             </a:r>
             <a:endParaRPr lang="de-DE" dirty="0" smtClean="0"/>
           </a:p>
@@ -21186,7 +21329,37 @@
             <a:pPr lvl="1"/>
             <a:r>
               <a:rPr lang="de-DE" dirty="0" err="1" smtClean="0"/>
-              <a:t>onAction</a:t>
+              <a:t>getScoreDefinition</a:t>
+            </a:r>
+            <a:r>
+              <a:rPr lang="de-DE" dirty="0" smtClean="0"/>
+              <a:t>() : </a:t>
+            </a:r>
+            <a:r>
+              <a:rPr lang="de-DE" dirty="0" err="1" smtClean="0"/>
+              <a:t>ScoreDefinition</a:t>
+            </a:r>
+            <a:endParaRPr lang="de-DE" dirty="0" smtClean="0"/>
+          </a:p>
+          <a:p>
+            <a:pPr lvl="1"/>
+            <a:endParaRPr lang="de-DE" dirty="0"/>
+          </a:p>
+          <a:p>
+            <a:r>
+              <a:rPr lang="de-DE" dirty="0" err="1" smtClean="0"/>
+              <a:t>IPauseable</a:t>
+            </a:r>
+            <a:r>
+              <a:rPr lang="de-DE" dirty="0" smtClean="0"/>
+              <a:t> (Optional)</a:t>
+            </a:r>
+          </a:p>
+          <a:p>
+            <a:pPr lvl="1"/>
+            <a:r>
+              <a:rPr lang="de-DE" dirty="0" err="1" smtClean="0"/>
+              <a:t>setPauseMode</a:t>
             </a:r>
             <a:r>
               <a:rPr lang="de-DE" dirty="0" smtClean="0"/>
@@ -21194,50 +21367,7 @@
             </a:r>
             <a:r>
               <a:rPr lang="de-DE" dirty="0" err="1" smtClean="0"/>
-              <a:t>IPlayer</a:t>
-            </a:r>
-            <a:r>
-              <a:rPr lang="de-DE" dirty="0" smtClean="0"/>
-              <a:t>, </a:t>
-            </a:r>
-            <a:r>
-              <a:rPr lang="de-DE" dirty="0" err="1" smtClean="0"/>
-              <a:t>Object</a:t>
-            </a:r>
-            <a:r>
-              <a:rPr lang="de-DE" dirty="0" smtClean="0"/>
-              <a:t>)</a:t>
-            </a:r>
-          </a:p>
-          <a:p>
-            <a:pPr lvl="1"/>
-            <a:r>
-              <a:rPr lang="de-DE" dirty="0" err="1" smtClean="0"/>
-              <a:t>onPlayerJoined</a:t>
-            </a:r>
-            <a:r>
-              <a:rPr lang="de-DE" dirty="0" smtClean="0"/>
-              <a:t>() : </a:t>
-            </a:r>
-            <a:r>
-              <a:rPr lang="de-DE" dirty="0" err="1" smtClean="0"/>
-              <a:t>IPlayer</a:t>
-            </a:r>
-            <a:endParaRPr lang="de-DE" dirty="0" smtClean="0"/>
-          </a:p>
-          <a:p>
-            <a:pPr lvl="1"/>
-            <a:r>
-              <a:rPr lang="de-DE" dirty="0" err="1" smtClean="0"/>
-              <a:t>onPlayerLeft</a:t>
-            </a:r>
-            <a:r>
-              <a:rPr lang="de-DE" dirty="0" smtClean="0"/>
-              <a:t>(</a:t>
-            </a:r>
-            <a:r>
-              <a:rPr lang="de-DE" dirty="0" err="1" smtClean="0"/>
-              <a:t>IPlayer</a:t>
+              <a:t>boolean</a:t>
             </a:r>
             <a:r>
               <a:rPr lang="de-DE" dirty="0" smtClean="0"/>
@@ -21247,58 +21377,19 @@
               <a:rPr lang="de-DE" dirty="0" err="1" smtClean="0"/>
               <a:t>void</a:t>
             </a:r>
-            <a:endParaRPr lang="de-DE" dirty="0"/>
+            <a:endParaRPr lang="de-DE" dirty="0" smtClean="0"/>
           </a:p>
           <a:p>
             <a:pPr lvl="1"/>
             <a:r>
-              <a:rPr lang="de-DE" dirty="0" err="1" smtClean="0"/>
-              <a:t>addGameListener</a:t>
-            </a:r>
-            <a:r>
               <a:rPr lang="de-DE" dirty="0" smtClean="0"/>
-              <a:t>(</a:t>
-            </a:r>
-            <a:r>
-              <a:rPr lang="de-DE" dirty="0" err="1" smtClean="0"/>
-              <a:t>IGameListener</a:t>
-            </a:r>
-            <a:r>
-              <a:rPr lang="de-DE" dirty="0" smtClean="0"/>
-              <a:t>) : </a:t>
+              <a:t>afterPause() : </a:t>
             </a:r>
             <a:r>
               <a:rPr lang="de-DE" dirty="0" err="1" smtClean="0"/>
               <a:t>void</a:t>
             </a:r>
             <a:endParaRPr lang="de-DE" dirty="0" smtClean="0"/>
-          </a:p>
-          <a:p>
-            <a:pPr lvl="1"/>
-            <a:r>
-              <a:rPr lang="de-DE" dirty="0" err="1" smtClean="0"/>
-              <a:t>removeGameListener</a:t>
-            </a:r>
-            <a:r>
-              <a:rPr lang="de-DE" dirty="0" smtClean="0"/>
-              <a:t>(</a:t>
-            </a:r>
-            <a:r>
-              <a:rPr lang="de-DE" dirty="0" err="1" smtClean="0"/>
-              <a:t>IGameListener</a:t>
-            </a:r>
-            <a:r>
-              <a:rPr lang="de-DE" dirty="0" smtClean="0"/>
-              <a:t>) : </a:t>
-            </a:r>
-            <a:r>
-              <a:rPr lang="de-DE" dirty="0" err="1" smtClean="0"/>
-              <a:t>void</a:t>
-            </a:r>
-            <a:endParaRPr lang="de-DE" dirty="0" smtClean="0"/>
-          </a:p>
-          <a:p>
-            <a:endParaRPr lang="de-DE" dirty="0"/>
           </a:p>
         </p:txBody>
       </p:sp>
@@ -21344,7 +21435,7 @@
           <a:p>
             <a:r>
               <a:rPr lang="de-DE" dirty="0" err="1" smtClean="0"/>
-              <a:t>IPlayer</a:t>
+              <a:t>IGameInstance</a:t>
             </a:r>
             <a:endParaRPr lang="de-DE" dirty="0"/>
           </a:p>
@@ -21368,7 +21459,39 @@
             <a:pPr lvl="1"/>
             <a:r>
               <a:rPr lang="de-DE" dirty="0" err="1" smtClean="0"/>
-              <a:t>addPlayerListener</a:t>
+              <a:t>start</a:t>
+            </a:r>
+            <a:r>
+              <a:rPr lang="de-DE" dirty="0" smtClean="0"/>
+              <a:t>() : </a:t>
+            </a:r>
+            <a:r>
+              <a:rPr lang="de-DE" dirty="0" err="1" smtClean="0"/>
+              <a:t>void</a:t>
+            </a:r>
+            <a:endParaRPr lang="de-DE" dirty="0" smtClean="0"/>
+          </a:p>
+          <a:p>
+            <a:pPr lvl="1"/>
+            <a:r>
+              <a:rPr lang="de-DE" dirty="0" err="1" smtClean="0"/>
+              <a:t>ready</a:t>
+            </a:r>
+            <a:r>
+              <a:rPr lang="de-DE" dirty="0" smtClean="0"/>
+              <a:t>() : </a:t>
+            </a:r>
+            <a:r>
+              <a:rPr lang="de-DE" dirty="0" err="1" smtClean="0"/>
+              <a:t>boolean</a:t>
+            </a:r>
+            <a:endParaRPr lang="de-DE" dirty="0" smtClean="0"/>
+          </a:p>
+          <a:p>
+            <a:pPr lvl="1"/>
+            <a:r>
+              <a:rPr lang="de-DE" dirty="0" err="1" smtClean="0"/>
+              <a:t>onAction</a:t>
             </a:r>
             <a:r>
               <a:rPr lang="de-DE" dirty="0" smtClean="0"/>
@@ -21376,7 +21499,50 @@
             </a:r>
             <a:r>
               <a:rPr lang="de-DE" dirty="0" err="1" smtClean="0"/>
-              <a:t>IPlayerListener</a:t>
+              <a:t>IPlayer</a:t>
+            </a:r>
+            <a:r>
+              <a:rPr lang="de-DE" dirty="0" smtClean="0"/>
+              <a:t>, </a:t>
+            </a:r>
+            <a:r>
+              <a:rPr lang="de-DE" dirty="0" err="1" smtClean="0"/>
+              <a:t>Object</a:t>
+            </a:r>
+            <a:r>
+              <a:rPr lang="de-DE" dirty="0" smtClean="0"/>
+              <a:t>)</a:t>
+            </a:r>
+          </a:p>
+          <a:p>
+            <a:pPr lvl="1"/>
+            <a:r>
+              <a:rPr lang="de-DE" dirty="0" err="1" smtClean="0"/>
+              <a:t>onPlayerJoined</a:t>
+            </a:r>
+            <a:r>
+              <a:rPr lang="de-DE" dirty="0" smtClean="0"/>
+              <a:t>() : </a:t>
+            </a:r>
+            <a:r>
+              <a:rPr lang="de-DE" dirty="0" err="1" smtClean="0"/>
+              <a:t>IPlayer</a:t>
+            </a:r>
+            <a:endParaRPr lang="de-DE" dirty="0" smtClean="0"/>
+          </a:p>
+          <a:p>
+            <a:pPr lvl="1"/>
+            <a:r>
+              <a:rPr lang="de-DE" dirty="0" err="1" smtClean="0"/>
+              <a:t>onPlayerLeft</a:t>
+            </a:r>
+            <a:r>
+              <a:rPr lang="de-DE" dirty="0" smtClean="0"/>
+              <a:t>(</a:t>
+            </a:r>
+            <a:r>
+              <a:rPr lang="de-DE" dirty="0" err="1" smtClean="0"/>
+              <a:t>IPlayer</a:t>
             </a:r>
             <a:r>
               <a:rPr lang="de-DE" dirty="0" smtClean="0"/>
@@ -21386,13 +21552,13 @@
               <a:rPr lang="de-DE" dirty="0" err="1" smtClean="0"/>
               <a:t>void</a:t>
             </a:r>
-            <a:endParaRPr lang="de-DE" dirty="0" smtClean="0"/>
+            <a:endParaRPr lang="de-DE" dirty="0"/>
           </a:p>
           <a:p>
             <a:pPr lvl="1"/>
             <a:r>
               <a:rPr lang="de-DE" dirty="0" err="1" smtClean="0"/>
-              <a:t>removePlayerListener</a:t>
+              <a:t>addGameListener</a:t>
             </a:r>
             <a:r>
               <a:rPr lang="de-DE" dirty="0" smtClean="0"/>
@@ -21400,7 +21566,7 @@
             </a:r>
             <a:r>
               <a:rPr lang="de-DE" dirty="0" err="1" smtClean="0"/>
-              <a:t>IPlayerListener</a:t>
+              <a:t>IGameListener</a:t>
             </a:r>
             <a:r>
               <a:rPr lang="de-DE" dirty="0" smtClean="0"/>
@@ -21416,11 +21582,19 @@
             <a:pPr lvl="1"/>
             <a:r>
               <a:rPr lang="de-DE" dirty="0" err="1" smtClean="0"/>
-              <a:t>setDisplayName</a:t>
+              <a:t>removeGameListener</a:t>
             </a:r>
             <a:r>
               <a:rPr lang="de-DE" dirty="0" smtClean="0"/>
-              <a:t>(String) : </a:t>
+              <a:t>(</a:t>
+            </a:r>
+            <a:r>
+              <a:rPr lang="de-DE" dirty="0" err="1" smtClean="0"/>
+              <a:t>IGameListener</a:t>
+            </a:r>
+            <a:r>
+              <a:rPr lang="de-DE" dirty="0" smtClean="0"/>
+              <a:t>) : </a:t>
             </a:r>
             <a:r>
               <a:rPr lang="de-DE" dirty="0" err="1" smtClean="0"/>
@@ -21429,63 +21603,6 @@
             <a:endParaRPr lang="de-DE" dirty="0" smtClean="0"/>
           </a:p>
           <a:p>
-            <a:pPr lvl="1"/>
-            <a:r>
-              <a:rPr lang="de-DE" dirty="0" err="1" smtClean="0"/>
-              <a:t>setShouldBePaused</a:t>
-            </a:r>
-            <a:r>
-              <a:rPr lang="de-DE" dirty="0" smtClean="0"/>
-              <a:t>(</a:t>
-            </a:r>
-            <a:r>
-              <a:rPr lang="de-DE" dirty="0" err="1" smtClean="0"/>
-              <a:t>boolean</a:t>
-            </a:r>
-            <a:r>
-              <a:rPr lang="de-DE" dirty="0" smtClean="0"/>
-              <a:t>) : </a:t>
-            </a:r>
-            <a:r>
-              <a:rPr lang="de-DE" dirty="0" err="1" smtClean="0"/>
-              <a:t>void</a:t>
-            </a:r>
-            <a:endParaRPr lang="de-DE" dirty="0" smtClean="0"/>
-          </a:p>
-          <a:p>
-            <a:pPr lvl="1"/>
-            <a:r>
-              <a:rPr lang="de-DE" dirty="0" err="1" smtClean="0"/>
-              <a:t>setCanTimeout</a:t>
-            </a:r>
-            <a:r>
-              <a:rPr lang="de-DE" dirty="0" smtClean="0"/>
-              <a:t>(</a:t>
-            </a:r>
-            <a:r>
-              <a:rPr lang="de-DE" dirty="0" err="1" smtClean="0"/>
-              <a:t>boolean</a:t>
-            </a:r>
-            <a:r>
-              <a:rPr lang="de-DE" dirty="0" smtClean="0"/>
-              <a:t>) : </a:t>
-            </a:r>
-            <a:r>
-              <a:rPr lang="de-DE" dirty="0" err="1" smtClean="0"/>
-              <a:t>void</a:t>
-            </a:r>
-            <a:endParaRPr lang="de-DE" dirty="0" smtClean="0"/>
-          </a:p>
-          <a:p>
-            <a:pPr lvl="1"/>
-            <a:endParaRPr lang="de-DE" dirty="0" smtClean="0"/>
-          </a:p>
-          <a:p>
-            <a:pPr lvl="1"/>
-            <a:endParaRPr lang="de-DE" dirty="0" smtClean="0"/>
-          </a:p>
-          <a:p>
-            <a:pPr lvl="1"/>
             <a:endParaRPr lang="de-DE" dirty="0"/>
           </a:p>
         </p:txBody>
@@ -21531,33 +21648,153 @@
           <a:lstStyle/>
           <a:p>
             <a:r>
-              <a:rPr lang="de-DE" dirty="0" smtClean="0"/>
-              <a:t>Kommunikation (Spiel zur GUI)</a:t>
+              <a:rPr lang="de-DE" dirty="0" err="1" smtClean="0"/>
+              <a:t>IPlayer</a:t>
             </a:r>
             <a:endParaRPr lang="de-DE" dirty="0"/>
           </a:p>
         </p:txBody>
       </p:sp>
-      <p:graphicFrame>
-        <p:nvGraphicFramePr>
-          <p:cNvPr id="4" name="Inhaltsplatzhalter 3"/>
-          <p:cNvGraphicFramePr>
-            <a:graphicFrameLocks noGrp="1"/>
-          </p:cNvGraphicFramePr>
+      <p:sp>
+        <p:nvSpPr>
+          <p:cNvPr id="3" name="Inhaltsplatzhalter 2"/>
+          <p:cNvSpPr>
+            <a:spLocks noGrp="1"/>
+          </p:cNvSpPr>
           <p:nvPr>
             <p:ph idx="1"/>
           </p:nvPr>
-        </p:nvGraphicFramePr>
-        <p:xfrm>
-          <a:off x="457200" y="1600200"/>
-          <a:ext cx="8229600" cy="4525963"/>
-        </p:xfrm>
-        <a:graphic>
-          <a:graphicData uri="http://schemas.openxmlformats.org/drawingml/2006/diagram">
-            <dgm:relIds xmlns:dgm="http://schemas.openxmlformats.org/drawingml/2006/diagram" xmlns:r="http://schemas.openxmlformats.org/officeDocument/2006/relationships" r:dm="rId2" r:lo="rId3" r:qs="rId4" r:cs="rId5"/>
-          </a:graphicData>
-        </a:graphic>
-      </p:graphicFrame>
+        </p:nvSpPr>
+        <p:spPr/>
+        <p:txBody>
+          <a:bodyPr/>
+          <a:lstStyle/>
+          <a:p>
+            <a:pPr lvl="1"/>
+            <a:r>
+              <a:rPr lang="de-DE" dirty="0" err="1" smtClean="0"/>
+              <a:t>addPlayerListener</a:t>
+            </a:r>
+            <a:r>
+              <a:rPr lang="de-DE" dirty="0" smtClean="0"/>
+              <a:t>(</a:t>
+            </a:r>
+            <a:r>
+              <a:rPr lang="de-DE" dirty="0" err="1" smtClean="0"/>
+              <a:t>IPlayerListener</a:t>
+            </a:r>
+            <a:r>
+              <a:rPr lang="de-DE" dirty="0" smtClean="0"/>
+              <a:t>) : </a:t>
+            </a:r>
+            <a:r>
+              <a:rPr lang="de-DE" dirty="0" err="1" smtClean="0"/>
+              <a:t>void</a:t>
+            </a:r>
+            <a:endParaRPr lang="de-DE" dirty="0" smtClean="0"/>
+          </a:p>
+          <a:p>
+            <a:pPr lvl="1"/>
+            <a:r>
+              <a:rPr lang="de-DE" dirty="0" err="1" smtClean="0"/>
+              <a:t>removePlayerListener</a:t>
+            </a:r>
+            <a:r>
+              <a:rPr lang="de-DE" dirty="0" smtClean="0"/>
+              <a:t>(</a:t>
+            </a:r>
+            <a:r>
+              <a:rPr lang="de-DE" dirty="0" err="1" smtClean="0"/>
+              <a:t>IPlayerListener</a:t>
+            </a:r>
+            <a:r>
+              <a:rPr lang="de-DE" dirty="0" smtClean="0"/>
+              <a:t>) : </a:t>
+            </a:r>
+            <a:r>
+              <a:rPr lang="de-DE" dirty="0" err="1" smtClean="0"/>
+              <a:t>void</a:t>
+            </a:r>
+            <a:endParaRPr lang="de-DE" dirty="0" smtClean="0"/>
+          </a:p>
+          <a:p>
+            <a:pPr lvl="1"/>
+            <a:r>
+              <a:rPr lang="de-DE" dirty="0" err="1" smtClean="0"/>
+              <a:t>setDisplayName</a:t>
+            </a:r>
+            <a:r>
+              <a:rPr lang="de-DE" dirty="0" smtClean="0"/>
+              <a:t>(String) : </a:t>
+            </a:r>
+            <a:r>
+              <a:rPr lang="de-DE" dirty="0" err="1" smtClean="0"/>
+              <a:t>void</a:t>
+            </a:r>
+            <a:endParaRPr lang="de-DE" dirty="0" smtClean="0"/>
+          </a:p>
+          <a:p>
+            <a:pPr lvl="1"/>
+            <a:r>
+              <a:rPr lang="de-DE" dirty="0" err="1" smtClean="0"/>
+              <a:t>setShouldBePaused</a:t>
+            </a:r>
+            <a:r>
+              <a:rPr lang="de-DE" dirty="0" smtClean="0"/>
+              <a:t>(</a:t>
+            </a:r>
+            <a:r>
+              <a:rPr lang="de-DE" dirty="0" err="1" smtClean="0"/>
+              <a:t>boolean</a:t>
+            </a:r>
+            <a:r>
+              <a:rPr lang="de-DE" dirty="0" smtClean="0"/>
+              <a:t>) : </a:t>
+            </a:r>
+            <a:r>
+              <a:rPr lang="de-DE" dirty="0" err="1" smtClean="0"/>
+              <a:t>void</a:t>
+            </a:r>
+            <a:endParaRPr lang="de-DE" dirty="0" smtClean="0"/>
+          </a:p>
+          <a:p>
+            <a:pPr lvl="1"/>
+            <a:r>
+              <a:rPr lang="de-DE" dirty="0" err="1" smtClean="0"/>
+              <a:t>setCanTimeout</a:t>
+            </a:r>
+            <a:r>
+              <a:rPr lang="de-DE" dirty="0" smtClean="0"/>
+              <a:t>(</a:t>
+            </a:r>
+            <a:r>
+              <a:rPr lang="de-DE" dirty="0" err="1" smtClean="0"/>
+              <a:t>boolean</a:t>
+            </a:r>
+            <a:r>
+              <a:rPr lang="de-DE" dirty="0" smtClean="0"/>
+              <a:t>) : </a:t>
+            </a:r>
+            <a:r>
+              <a:rPr lang="de-DE" dirty="0" err="1" smtClean="0"/>
+              <a:t>void</a:t>
+            </a:r>
+            <a:endParaRPr lang="de-DE" dirty="0" smtClean="0"/>
+          </a:p>
+          <a:p>
+            <a:pPr lvl="1"/>
+            <a:endParaRPr lang="de-DE" dirty="0" smtClean="0"/>
+          </a:p>
+          <a:p>
+            <a:pPr lvl="1"/>
+            <a:endParaRPr lang="de-DE" dirty="0" smtClean="0"/>
+          </a:p>
+          <a:p>
+            <a:pPr lvl="1"/>
+            <a:endParaRPr lang="de-DE" dirty="0"/>
+          </a:p>
+        </p:txBody>
+      </p:sp>
     </p:spTree>
   </p:cSld>
   <p:clrMapOvr>
@@ -21585,7 +21822,7 @@
       </p:grpSpPr>
       <p:sp>
         <p:nvSpPr>
-          <p:cNvPr id="4" name="Titel 3"/>
+          <p:cNvPr id="2" name="Titel 1"/>
           <p:cNvSpPr>
             <a:spLocks noGrp="1"/>
           </p:cNvSpPr>
@@ -21600,39 +21837,32 @@
           <a:p>
             <a:r>
               <a:rPr lang="de-DE" dirty="0" smtClean="0"/>
-              <a:t>Plugin-Framework</a:t>
+              <a:t>Kommunikation (Spiel zur GUI)</a:t>
             </a:r>
             <a:endParaRPr lang="de-DE" dirty="0"/>
           </a:p>
         </p:txBody>
       </p:sp>
-      <p:sp>
-        <p:nvSpPr>
-          <p:cNvPr id="5" name="Textplatzhalter 4"/>
-          <p:cNvSpPr>
-            <a:spLocks noGrp="1"/>
-          </p:cNvSpPr>
+      <p:graphicFrame>
+        <p:nvGraphicFramePr>
+          <p:cNvPr id="4" name="Inhaltsplatzhalter 3"/>
+          <p:cNvGraphicFramePr>
+            <a:graphicFrameLocks noGrp="1"/>
+          </p:cNvGraphicFramePr>
           <p:nvPr>
-            <p:ph type="body" idx="1"/>
+            <p:ph idx="1"/>
           </p:nvPr>
-        </p:nvSpPr>
-        <p:spPr/>
-        <p:txBody>
-          <a:bodyPr/>
-          <a:lstStyle/>
-          <a:p>
-            <a:r>
-              <a:rPr lang="de-DE" dirty="0" smtClean="0"/>
-              <a:t>Vereinfachung der Entwicklung neuer </a:t>
-            </a:r>
-            <a:r>
-              <a:rPr lang="de-DE" dirty="0" err="1" smtClean="0"/>
-              <a:t>Plugins</a:t>
-            </a:r>
-            <a:endParaRPr lang="de-DE" dirty="0"/>
-          </a:p>
-        </p:txBody>
-      </p:sp>
+        </p:nvGraphicFramePr>
+        <p:xfrm>
+          <a:off x="457200" y="1600200"/>
+          <a:ext cx="8229600" cy="4525963"/>
+        </p:xfrm>
+        <a:graphic>
+          <a:graphicData uri="http://schemas.openxmlformats.org/drawingml/2006/diagram">
+            <dgm:relIds xmlns:dgm="http://schemas.openxmlformats.org/drawingml/2006/diagram" xmlns:r="http://schemas.openxmlformats.org/officeDocument/2006/relationships" r:dm="rId2" r:lo="rId3" r:qs="rId4" r:cs="rId5"/>
+          </a:graphicData>
+        </a:graphic>
+      </p:graphicFrame>
     </p:spTree>
   </p:cSld>
   <p:clrMapOvr>
@@ -21803,6 +22033,81 @@
           <a:p>
             <a:r>
               <a:rPr lang="de-DE" dirty="0" smtClean="0"/>
+              <a:t>Plugin-Framework</a:t>
+            </a:r>
+            <a:endParaRPr lang="de-DE" dirty="0"/>
+          </a:p>
+        </p:txBody>
+      </p:sp>
+      <p:sp>
+        <p:nvSpPr>
+          <p:cNvPr id="5" name="Textplatzhalter 4"/>
+          <p:cNvSpPr>
+            <a:spLocks noGrp="1"/>
+          </p:cNvSpPr>
+          <p:nvPr>
+            <p:ph type="body" idx="1"/>
+          </p:nvPr>
+        </p:nvSpPr>
+        <p:spPr/>
+        <p:txBody>
+          <a:bodyPr/>
+          <a:lstStyle/>
+          <a:p>
+            <a:r>
+              <a:rPr lang="de-DE" dirty="0" smtClean="0"/>
+              <a:t>Vereinfachung der Entwicklung neuer </a:t>
+            </a:r>
+            <a:r>
+              <a:rPr lang="de-DE" dirty="0" err="1" smtClean="0"/>
+              <a:t>Plugins</a:t>
+            </a:r>
+            <a:endParaRPr lang="de-DE" dirty="0"/>
+          </a:p>
+        </p:txBody>
+      </p:sp>
+    </p:spTree>
+  </p:cSld>
+  <p:clrMapOvr>
+    <a:masterClrMapping/>
+  </p:clrMapOvr>
+</p:sld>
+</file>
+
+<file path=ppt/slides/slide31.xml><?xml version="1.0" encoding="utf-8"?>
+<p:sld xmlns:a="http://schemas.openxmlformats.org/drawingml/2006/main" xmlns:r="http://schemas.openxmlformats.org/officeDocument/2006/relationships" xmlns:p="http://schemas.openxmlformats.org/presentationml/2006/main">
+  <p:cSld>
+    <p:spTree>
+      <p:nvGrpSpPr>
+        <p:cNvPr id="1" name=""/>
+        <p:cNvGrpSpPr/>
+        <p:nvPr/>
+      </p:nvGrpSpPr>
+      <p:grpSpPr>
+        <a:xfrm>
+          <a:off x="0" y="0"/>
+          <a:ext cx="0" cy="0"/>
+          <a:chOff x="0" y="0"/>
+          <a:chExt cx="0" cy="0"/>
+        </a:xfrm>
+      </p:grpSpPr>
+      <p:sp>
+        <p:nvSpPr>
+          <p:cNvPr id="4" name="Titel 3"/>
+          <p:cNvSpPr>
+            <a:spLocks noGrp="1"/>
+          </p:cNvSpPr>
+          <p:nvPr>
+            <p:ph type="title"/>
+          </p:nvPr>
+        </p:nvSpPr>
+        <p:spPr/>
+        <p:txBody>
+          <a:bodyPr/>
+          <a:lstStyle/>
+          <a:p>
+            <a:r>
+              <a:rPr lang="de-DE" dirty="0" smtClean="0"/>
               <a:t>Was funktioniert oft ähnlich?</a:t>
             </a:r>
             <a:endParaRPr lang="de-DE" dirty="0"/>
@@ -21887,7 +22192,7 @@
 </p:sld>
 </file>
 
-<file path=ppt/slides/slide31.xml><?xml version="1.0" encoding="utf-8"?>
+<file path=ppt/slides/slide32.xml><?xml version="1.0" encoding="utf-8"?>
 <p:sld xmlns:a="http://schemas.openxmlformats.org/drawingml/2006/main" xmlns:r="http://schemas.openxmlformats.org/officeDocument/2006/relationships" xmlns:p="http://schemas.openxmlformats.org/presentationml/2006/main">
   <p:cSld>
     <p:spTree>
@@ -23135,163 +23440,6 @@
 </p:sld>
 </file>
 
-<file path=ppt/slides/slide32.xml><?xml version="1.0" encoding="utf-8"?>
-<p:sld xmlns:a="http://schemas.openxmlformats.org/drawingml/2006/main" xmlns:r="http://schemas.openxmlformats.org/officeDocument/2006/relationships" xmlns:p="http://schemas.openxmlformats.org/presentationml/2006/main">
-  <p:cSld>
-    <p:spTree>
-      <p:nvGrpSpPr>
-        <p:cNvPr id="1" name=""/>
-        <p:cNvGrpSpPr/>
-        <p:nvPr/>
-      </p:nvGrpSpPr>
-      <p:grpSpPr>
-        <a:xfrm>
-          <a:off x="0" y="0"/>
-          <a:ext cx="0" cy="0"/>
-          <a:chOff x="0" y="0"/>
-          <a:chExt cx="0" cy="0"/>
-        </a:xfrm>
-      </p:grpSpPr>
-      <p:sp>
-        <p:nvSpPr>
-          <p:cNvPr id="2" name="Titel 1"/>
-          <p:cNvSpPr>
-            <a:spLocks noGrp="1"/>
-          </p:cNvSpPr>
-          <p:nvPr>
-            <p:ph type="title"/>
-          </p:nvPr>
-        </p:nvSpPr>
-        <p:spPr/>
-        <p:txBody>
-          <a:bodyPr/>
-          <a:lstStyle/>
-          <a:p>
-            <a:r>
-              <a:rPr lang="de-DE" dirty="0" smtClean="0"/>
-              <a:t>Framework</a:t>
-            </a:r>
-            <a:endParaRPr lang="de-DE" dirty="0"/>
-          </a:p>
-        </p:txBody>
-      </p:sp>
-      <p:sp>
-        <p:nvSpPr>
-          <p:cNvPr id="3" name="Inhaltsplatzhalter 2"/>
-          <p:cNvSpPr>
-            <a:spLocks noGrp="1"/>
-          </p:cNvSpPr>
-          <p:nvPr>
-            <p:ph idx="1"/>
-          </p:nvPr>
-        </p:nvSpPr>
-        <p:spPr/>
-        <p:txBody>
-          <a:bodyPr>
-            <a:normAutofit lnSpcReduction="10000"/>
-          </a:bodyPr>
-          <a:lstStyle/>
-          <a:p>
-            <a:r>
-              <a:rPr lang="de-DE" dirty="0" smtClean="0"/>
-              <a:t>Bereitstellung von abstrakten Klassen</a:t>
-            </a:r>
-          </a:p>
-          <a:p>
-            <a:pPr lvl="1"/>
-            <a:r>
-              <a:rPr lang="de-DE" dirty="0" err="1" smtClean="0"/>
-              <a:t>SimpleGameInstance</a:t>
-            </a:r>
-            <a:endParaRPr lang="de-DE" dirty="0" smtClean="0"/>
-          </a:p>
-          <a:p>
-            <a:pPr lvl="2"/>
-            <a:r>
-              <a:rPr lang="de-DE" dirty="0" smtClean="0"/>
-              <a:t>Implementiert </a:t>
-            </a:r>
-            <a:r>
-              <a:rPr lang="de-DE" dirty="0" err="1" smtClean="0"/>
-              <a:t>IGameInstance</a:t>
-            </a:r>
-            <a:endParaRPr lang="de-DE" dirty="0" smtClean="0"/>
-          </a:p>
-          <a:p>
-            <a:pPr lvl="1"/>
-            <a:r>
-              <a:rPr lang="de-DE" dirty="0" err="1" smtClean="0"/>
-              <a:t>SimplePlayer</a:t>
-            </a:r>
-            <a:endParaRPr lang="de-DE" dirty="0" smtClean="0"/>
-          </a:p>
-          <a:p>
-            <a:pPr lvl="2"/>
-            <a:r>
-              <a:rPr lang="de-DE" dirty="0" smtClean="0"/>
-              <a:t>Implementiert </a:t>
-            </a:r>
-            <a:r>
-              <a:rPr lang="de-DE" dirty="0" err="1" smtClean="0"/>
-              <a:t>IPlayer</a:t>
-            </a:r>
-            <a:endParaRPr lang="de-DE" dirty="0" smtClean="0"/>
-          </a:p>
-          <a:p>
-            <a:pPr lvl="1"/>
-            <a:r>
-              <a:rPr lang="de-DE" dirty="0" err="1" smtClean="0"/>
-              <a:t>RoundBasedGameInstance</a:t>
-            </a:r>
-            <a:endParaRPr lang="de-DE" dirty="0"/>
-          </a:p>
-          <a:p>
-            <a:pPr lvl="2"/>
-            <a:r>
-              <a:rPr lang="de-DE" dirty="0" smtClean="0"/>
-              <a:t>Erweitert </a:t>
-            </a:r>
-            <a:r>
-              <a:rPr lang="de-DE" dirty="0" err="1" smtClean="0"/>
-              <a:t>SimpleGameInstance</a:t>
-            </a:r>
-            <a:endParaRPr lang="de-DE" dirty="0" smtClean="0"/>
-          </a:p>
-          <a:p>
-            <a:r>
-              <a:rPr lang="de-DE" dirty="0" smtClean="0"/>
-              <a:t>Aufzeichnungen speichern / laden</a:t>
-            </a:r>
-          </a:p>
-          <a:p>
-            <a:pPr lvl="1"/>
-            <a:r>
-              <a:rPr lang="de-DE" dirty="0" smtClean="0"/>
-              <a:t>XML </a:t>
-            </a:r>
-            <a:r>
-              <a:rPr lang="de-DE" dirty="0" err="1" smtClean="0"/>
-              <a:t>Serialisierung</a:t>
-            </a:r>
-            <a:r>
-              <a:rPr lang="de-DE" dirty="0"/>
-              <a:t>,</a:t>
-            </a:r>
-            <a:r>
-              <a:rPr lang="de-DE" dirty="0" smtClean="0"/>
-              <a:t> GZIP Kompression</a:t>
-            </a:r>
-          </a:p>
-        </p:txBody>
-      </p:sp>
-    </p:spTree>
-  </p:cSld>
-  <p:clrMapOvr>
-    <a:masterClrMapping/>
-  </p:clrMapOvr>
-</p:sld>
-</file>
-
 <file path=ppt/slides/slide33.xml><?xml version="1.0" encoding="utf-8"?>
 <p:sld xmlns:a="http://schemas.openxmlformats.org/drawingml/2006/main" xmlns:r="http://schemas.openxmlformats.org/officeDocument/2006/relationships" xmlns:p="http://schemas.openxmlformats.org/presentationml/2006/main">
   <p:cSld>
@@ -23326,7 +23474,7 @@
           <a:p>
             <a:r>
               <a:rPr lang="de-DE" dirty="0" smtClean="0"/>
-              <a:t>Vorteile</a:t>
+              <a:t>Framework</a:t>
             </a:r>
             <a:endParaRPr lang="de-DE" dirty="0"/>
           </a:p>
@@ -23344,35 +23492,104 @@
         </p:nvSpPr>
         <p:spPr/>
         <p:txBody>
-          <a:bodyPr/>
+          <a:bodyPr>
+            <a:normAutofit lnSpcReduction="10000"/>
+          </a:bodyPr>
           <a:lstStyle/>
           <a:p>
             <a:r>
               <a:rPr lang="de-DE" dirty="0" smtClean="0"/>
-              <a:t>Reduzierung von</a:t>
+              <a:t>Bereitstellung von abstrakten Klassen</a:t>
             </a:r>
           </a:p>
           <a:p>
             <a:pPr lvl="1"/>
             <a:r>
+              <a:rPr lang="de-DE" dirty="0" err="1" smtClean="0"/>
+              <a:t>SimpleGameInstance</a:t>
+            </a:r>
+            <a:endParaRPr lang="de-DE" dirty="0" smtClean="0"/>
+          </a:p>
+          <a:p>
+            <a:pPr lvl="2"/>
+            <a:r>
               <a:rPr lang="de-DE" dirty="0" smtClean="0"/>
-              <a:t>Komplexität</a:t>
-            </a:r>
+              <a:t>Implementiert </a:t>
+            </a:r>
+            <a:r>
+              <a:rPr lang="de-DE" dirty="0" err="1" smtClean="0"/>
+              <a:t>IGameInstance</a:t>
+            </a:r>
+            <a:endParaRPr lang="de-DE" dirty="0" smtClean="0"/>
           </a:p>
           <a:p>
             <a:pPr lvl="1"/>
             <a:r>
+              <a:rPr lang="de-DE" dirty="0" err="1" smtClean="0"/>
+              <a:t>SimplePlayer</a:t>
+            </a:r>
+            <a:endParaRPr lang="de-DE" dirty="0" smtClean="0"/>
+          </a:p>
+          <a:p>
+            <a:pPr lvl="2"/>
+            <a:r>
               <a:rPr lang="de-DE" dirty="0" smtClean="0"/>
-              <a:t>Entwicklungsaufwand</a:t>
-            </a:r>
+              <a:t>Implementiert </a:t>
+            </a:r>
+            <a:r>
+              <a:rPr lang="de-DE" dirty="0" err="1" smtClean="0"/>
+              <a:t>IPlayer</a:t>
+            </a:r>
+            <a:endParaRPr lang="de-DE" dirty="0" smtClean="0"/>
           </a:p>
           <a:p>
             <a:pPr lvl="1"/>
             <a:r>
+              <a:rPr lang="de-DE" dirty="0" err="1" smtClean="0"/>
+              <a:t>RoundBasedGameInstance</a:t>
+            </a:r>
+            <a:endParaRPr lang="de-DE" dirty="0"/>
+          </a:p>
+          <a:p>
+            <a:pPr lvl="2"/>
+            <a:r>
               <a:rPr lang="de-DE" dirty="0" smtClean="0"/>
-              <a:t>LOCs</a:t>
-            </a:r>
-            <a:endParaRPr lang="de-DE" dirty="0"/>
+              <a:t>Erweitert </a:t>
+            </a:r>
+            <a:r>
+              <a:rPr lang="de-DE" dirty="0" err="1" smtClean="0"/>
+              <a:t>SimpleGameInstance</a:t>
+            </a:r>
+            <a:endParaRPr lang="de-DE" dirty="0" smtClean="0"/>
+          </a:p>
+          <a:p>
+            <a:r>
+              <a:rPr lang="de-DE" dirty="0" smtClean="0"/>
+              <a:t>Mitschnitte abspeichern </a:t>
+            </a:r>
+            <a:r>
+              <a:rPr lang="de-DE" dirty="0" smtClean="0"/>
+              <a:t>/ laden</a:t>
+            </a:r>
+          </a:p>
+          <a:p>
+            <a:pPr lvl="1"/>
+            <a:r>
+              <a:rPr lang="de-DE" dirty="0" smtClean="0"/>
+              <a:t>XML </a:t>
+            </a:r>
+            <a:r>
+              <a:rPr lang="de-DE" dirty="0" err="1" smtClean="0"/>
+              <a:t>Serialisierung</a:t>
+            </a:r>
+            <a:r>
+              <a:rPr lang="de-DE" dirty="0"/>
+              <a:t>,</a:t>
+            </a:r>
+            <a:r>
+              <a:rPr lang="de-DE" dirty="0" smtClean="0"/>
+              <a:t> GZIP Kompression</a:t>
+            </a:r>
           </a:p>
         </p:txBody>
       </p:sp>
@@ -23403,7 +23620,7 @@
       </p:grpSpPr>
       <p:sp>
         <p:nvSpPr>
-          <p:cNvPr id="4" name="Titel 3"/>
+          <p:cNvPr id="2" name="Titel 1"/>
           <p:cNvSpPr>
             <a:spLocks noGrp="1"/>
           </p:cNvSpPr>
@@ -23418,7 +23635,7 @@
           <a:p>
             <a:r>
               <a:rPr lang="de-DE" dirty="0" smtClean="0"/>
-              <a:t>„Hase und Igel“ Plugin (Logik)</a:t>
+              <a:t>Vorteile</a:t>
             </a:r>
             <a:endParaRPr lang="de-DE" dirty="0"/>
           </a:p>
@@ -23426,12 +23643,12 @@
       </p:sp>
       <p:sp>
         <p:nvSpPr>
-          <p:cNvPr id="5" name="Textplatzhalter 4"/>
+          <p:cNvPr id="3" name="Inhaltsplatzhalter 2"/>
           <p:cNvSpPr>
             <a:spLocks noGrp="1"/>
           </p:cNvSpPr>
           <p:nvPr>
-            <p:ph type="body" idx="1"/>
+            <p:ph idx="1"/>
           </p:nvPr>
         </p:nvSpPr>
         <p:spPr/>
@@ -23441,11 +23658,28 @@
           <a:p>
             <a:r>
               <a:rPr lang="de-DE" dirty="0" smtClean="0"/>
-              <a:t>Vereinfachung der Entwicklung neuer </a:t>
-            </a:r>
-            <a:r>
-              <a:rPr lang="de-DE" dirty="0" err="1" smtClean="0"/>
-              <a:t>Plugins</a:t>
+              <a:t>Reduzierung von</a:t>
+            </a:r>
+          </a:p>
+          <a:p>
+            <a:pPr lvl="1"/>
+            <a:r>
+              <a:rPr lang="de-DE" dirty="0" smtClean="0"/>
+              <a:t>Komplexität</a:t>
+            </a:r>
+          </a:p>
+          <a:p>
+            <a:pPr lvl="1"/>
+            <a:r>
+              <a:rPr lang="de-DE" dirty="0" smtClean="0"/>
+              <a:t>Entwicklungsaufwand</a:t>
+            </a:r>
+          </a:p>
+          <a:p>
+            <a:pPr lvl="1"/>
+            <a:r>
+              <a:rPr lang="de-DE" dirty="0" smtClean="0"/>
+              <a:t>LOCs</a:t>
             </a:r>
             <a:endParaRPr lang="de-DE" dirty="0"/>
           </a:p>
@@ -23492,6 +23726,81 @@
           <a:lstStyle/>
           <a:p>
             <a:r>
+              <a:rPr lang="de-DE" dirty="0" smtClean="0"/>
+              <a:t>„Hase und Igel“ Plugin (Logik)</a:t>
+            </a:r>
+            <a:endParaRPr lang="de-DE" dirty="0"/>
+          </a:p>
+        </p:txBody>
+      </p:sp>
+      <p:sp>
+        <p:nvSpPr>
+          <p:cNvPr id="5" name="Textplatzhalter 4"/>
+          <p:cNvSpPr>
+            <a:spLocks noGrp="1"/>
+          </p:cNvSpPr>
+          <p:nvPr>
+            <p:ph type="body" idx="1"/>
+          </p:nvPr>
+        </p:nvSpPr>
+        <p:spPr/>
+        <p:txBody>
+          <a:bodyPr/>
+          <a:lstStyle/>
+          <a:p>
+            <a:r>
+              <a:rPr lang="de-DE" dirty="0" smtClean="0"/>
+              <a:t>Vereinfachung der Entwicklung neuer </a:t>
+            </a:r>
+            <a:r>
+              <a:rPr lang="de-DE" dirty="0" err="1" smtClean="0"/>
+              <a:t>Plugins</a:t>
+            </a:r>
+            <a:endParaRPr lang="de-DE" dirty="0"/>
+          </a:p>
+        </p:txBody>
+      </p:sp>
+    </p:spTree>
+  </p:cSld>
+  <p:clrMapOvr>
+    <a:masterClrMapping/>
+  </p:clrMapOvr>
+</p:sld>
+</file>
+
+<file path=ppt/slides/slide36.xml><?xml version="1.0" encoding="utf-8"?>
+<p:sld xmlns:a="http://schemas.openxmlformats.org/drawingml/2006/main" xmlns:r="http://schemas.openxmlformats.org/officeDocument/2006/relationships" xmlns:p="http://schemas.openxmlformats.org/presentationml/2006/main">
+  <p:cSld>
+    <p:spTree>
+      <p:nvGrpSpPr>
+        <p:cNvPr id="1" name=""/>
+        <p:cNvGrpSpPr/>
+        <p:nvPr/>
+      </p:nvGrpSpPr>
+      <p:grpSpPr>
+        <a:xfrm>
+          <a:off x="0" y="0"/>
+          <a:ext cx="0" cy="0"/>
+          <a:chOff x="0" y="0"/>
+          <a:chExt cx="0" cy="0"/>
+        </a:xfrm>
+      </p:grpSpPr>
+      <p:sp>
+        <p:nvSpPr>
+          <p:cNvPr id="4" name="Titel 3"/>
+          <p:cNvSpPr>
+            <a:spLocks noGrp="1"/>
+          </p:cNvSpPr>
+          <p:nvPr>
+            <p:ph type="title"/>
+          </p:nvPr>
+        </p:nvSpPr>
+        <p:spPr/>
+        <p:txBody>
+          <a:bodyPr/>
+          <a:lstStyle/>
+          <a:p>
+            <a:r>
               <a:rPr lang="de-DE" dirty="0" err="1" smtClean="0"/>
               <a:t>ToDo</a:t>
             </a:r>
@@ -23530,7 +23839,7 @@
 </p:sld>
 </file>
 
-<file path=ppt/slides/slide36.xml><?xml version="1.0" encoding="utf-8"?>
+<file path=ppt/slides/slide37.xml><?xml version="1.0" encoding="utf-8"?>
 <p:sld xmlns:a="http://schemas.openxmlformats.org/drawingml/2006/main" xmlns:r="http://schemas.openxmlformats.org/officeDocument/2006/relationships" xmlns:p="http://schemas.openxmlformats.org/presentationml/2006/main">
   <p:cSld>
     <p:spTree>
@@ -23588,85 +23897,6 @@
             <a:r>
               <a:rPr lang="de-DE" dirty="0" smtClean="0"/>
               <a:t>Jetzt haben wir Zeit für eine</a:t>
-            </a:r>
-            <a:endParaRPr lang="de-DE" dirty="0"/>
-          </a:p>
-        </p:txBody>
-      </p:sp>
-    </p:spTree>
-  </p:cSld>
-  <p:clrMapOvr>
-    <a:masterClrMapping/>
-  </p:clrMapOvr>
-</p:sld>
-</file>
-
-<file path=ppt/slides/slide37.xml><?xml version="1.0" encoding="utf-8"?>
-<p:sld xmlns:a="http://schemas.openxmlformats.org/drawingml/2006/main" xmlns:r="http://schemas.openxmlformats.org/officeDocument/2006/relationships" xmlns:p="http://schemas.openxmlformats.org/presentationml/2006/main">
-  <p:cSld>
-    <p:spTree>
-      <p:nvGrpSpPr>
-        <p:cNvPr id="1" name=""/>
-        <p:cNvGrpSpPr/>
-        <p:nvPr/>
-      </p:nvGrpSpPr>
-      <p:grpSpPr>
-        <a:xfrm>
-          <a:off x="0" y="0"/>
-          <a:ext cx="0" cy="0"/>
-          <a:chOff x="0" y="0"/>
-          <a:chExt cx="0" cy="0"/>
-        </a:xfrm>
-      </p:grpSpPr>
-      <p:sp>
-        <p:nvSpPr>
-          <p:cNvPr id="4" name="Titel 3"/>
-          <p:cNvSpPr>
-            <a:spLocks noGrp="1"/>
-          </p:cNvSpPr>
-          <p:nvPr>
-            <p:ph type="title"/>
-          </p:nvPr>
-        </p:nvSpPr>
-        <p:spPr/>
-        <p:txBody>
-          <a:bodyPr/>
-          <a:lstStyle/>
-          <a:p>
-            <a:r>
-              <a:rPr lang="de-DE" dirty="0" smtClean="0"/>
-              <a:t>„Hase und Igel“ an Schulen</a:t>
-            </a:r>
-            <a:endParaRPr lang="de-DE" dirty="0"/>
-          </a:p>
-        </p:txBody>
-      </p:sp>
-      <p:sp>
-        <p:nvSpPr>
-          <p:cNvPr id="5" name="Textplatzhalter 4"/>
-          <p:cNvSpPr>
-            <a:spLocks noGrp="1"/>
-          </p:cNvSpPr>
-          <p:nvPr>
-            <p:ph type="body" idx="1"/>
-          </p:nvPr>
-        </p:nvSpPr>
-        <p:spPr/>
-        <p:txBody>
-          <a:bodyPr/>
-          <a:lstStyle/>
-          <a:p>
-            <a:r>
-              <a:rPr lang="de-DE" dirty="0" smtClean="0"/>
-              <a:t>Der „</a:t>
-            </a:r>
-            <a:r>
-              <a:rPr lang="de-DE" dirty="0" err="1" smtClean="0"/>
-              <a:t>SimpleClient</a:t>
-            </a:r>
-            <a:r>
-              <a:rPr lang="de-DE" dirty="0" smtClean="0"/>
-              <a:t>“ sowie die Bibliothek für Schulen</a:t>
             </a:r>
             <a:endParaRPr lang="de-DE" dirty="0"/>
           </a:p>
@@ -23714,7 +23944,7 @@
           <a:p>
             <a:r>
               <a:rPr lang="de-DE" dirty="0" smtClean="0"/>
-              <a:t>Anforderungen</a:t>
+              <a:t>„Hase und Igel“ an Schulen</a:t>
             </a:r>
             <a:endParaRPr lang="de-DE" dirty="0"/>
           </a:p>
@@ -23722,12 +23952,12 @@
       </p:sp>
       <p:sp>
         <p:nvSpPr>
-          <p:cNvPr id="5" name="Inhaltsplatzhalter 4"/>
+          <p:cNvPr id="5" name="Textplatzhalter 4"/>
           <p:cNvSpPr>
             <a:spLocks noGrp="1"/>
           </p:cNvSpPr>
           <p:nvPr>
-            <p:ph idx="1"/>
+            <p:ph type="body" idx="1"/>
           </p:nvPr>
         </p:nvSpPr>
         <p:spPr/>
@@ -23737,32 +23967,16 @@
           <a:p>
             <a:r>
               <a:rPr lang="de-DE" dirty="0" smtClean="0"/>
-              <a:t>Einfach halten</a:t>
-            </a:r>
-          </a:p>
-          <a:p>
+              <a:t>Der „</a:t>
+            </a:r>
+            <a:r>
+              <a:rPr lang="de-DE" dirty="0" err="1" smtClean="0"/>
+              <a:t>SimpleClient</a:t>
+            </a:r>
             <a:r>
               <a:rPr lang="de-DE" dirty="0" smtClean="0"/>
-              <a:t>Verständliche Verwendung</a:t>
-            </a:r>
-          </a:p>
-          <a:p>
-            <a:r>
-              <a:rPr lang="de-DE" dirty="0" smtClean="0"/>
-              <a:t>Gute Dokumentation</a:t>
-            </a:r>
-          </a:p>
-          <a:p>
-            <a:r>
-              <a:rPr lang="de-DE" dirty="0" smtClean="0"/>
-              <a:t>Für Fortgeschrittene </a:t>
-            </a:r>
-            <a:r>
-              <a:rPr lang="de-DE" dirty="0" smtClean="0"/>
-              <a:t>praktikabel halten</a:t>
-            </a:r>
-          </a:p>
-          <a:p>
+              <a:t>“ sowie die Bibliothek für Schulen</a:t>
+            </a:r>
             <a:endParaRPr lang="de-DE" dirty="0"/>
           </a:p>
         </p:txBody>
@@ -23808,12 +24022,8 @@
           <a:lstStyle/>
           <a:p>
             <a:r>
-              <a:rPr lang="de-DE" dirty="0" err="1" smtClean="0"/>
-              <a:t>SimpleClient</a:t>
-            </a:r>
-            <a:r>
               <a:rPr lang="de-DE" dirty="0" smtClean="0"/>
-              <a:t> Framework</a:t>
+              <a:t>Anforderungen</a:t>
             </a:r>
             <a:endParaRPr lang="de-DE" dirty="0"/>
           </a:p>
@@ -23836,39 +24046,29 @@
           <a:p>
             <a:r>
               <a:rPr lang="de-DE" dirty="0" smtClean="0"/>
-              <a:t>„Kara“-Methode</a:t>
+              <a:t>Einfach halten</a:t>
             </a:r>
           </a:p>
           <a:p>
             <a:r>
               <a:rPr lang="de-DE" dirty="0" smtClean="0"/>
-              <a:t>ZugSenden für Fortgeschrittene</a:t>
+              <a:t>Verständliche Verwendung</a:t>
             </a:r>
           </a:p>
           <a:p>
             <a:r>
               <a:rPr lang="de-DE" dirty="0" smtClean="0"/>
-              <a:t>Viele Werkzeug-Funktionen</a:t>
+              <a:t>Gute Dokumentation</a:t>
             </a:r>
           </a:p>
           <a:p>
             <a:r>
               <a:rPr lang="de-DE" dirty="0" smtClean="0"/>
-              <a:t>Methoden und Dokumentation auf Deutsch</a:t>
-            </a:r>
-          </a:p>
-          <a:p>
-            <a:r>
-              <a:rPr lang="de-DE" dirty="0" smtClean="0"/>
-              <a:t>Möglichst viel interne Logik entfernt</a:t>
-            </a:r>
-          </a:p>
-          <a:p>
-            <a:pPr lvl="1"/>
-            <a:r>
-              <a:rPr lang="de-DE" dirty="0" smtClean="0"/>
-              <a:t>Nur noch zwei Java-Dateien</a:t>
-            </a:r>
+              <a:t>Für Fortgeschrittene praktikabel halten</a:t>
+            </a:r>
+          </a:p>
+          <a:p>
+            <a:endParaRPr lang="de-DE" dirty="0"/>
           </a:p>
         </p:txBody>
       </p:sp>
@@ -23977,7 +24177,7 @@
       </p:grpSpPr>
       <p:sp>
         <p:nvSpPr>
-          <p:cNvPr id="2" name="Titel 1"/>
+          <p:cNvPr id="4" name="Titel 3"/>
           <p:cNvSpPr>
             <a:spLocks noGrp="1"/>
           </p:cNvSpPr>
@@ -23991,41 +24191,74 @@
           <a:lstStyle/>
           <a:p>
             <a:r>
+              <a:rPr lang="de-DE" dirty="0" err="1" smtClean="0"/>
+              <a:t>SimpleClient</a:t>
+            </a:r>
+            <a:r>
               <a:rPr lang="de-DE" dirty="0" smtClean="0"/>
-              <a:t>„Kara“-Methode</a:t>
+              <a:t> Framework</a:t>
             </a:r>
             <a:endParaRPr lang="de-DE" dirty="0"/>
           </a:p>
         </p:txBody>
       </p:sp>
-      <p:pic>
-        <p:nvPicPr>
-          <p:cNvPr id="8194" name="Picture 2" descr="C:\Users\Marcel\Documents\kara.png"/>
-          <p:cNvPicPr>
-            <a:picLocks noGrp="1" noChangeAspect="1" noChangeArrowheads="1"/>
-          </p:cNvPicPr>
+      <p:sp>
+        <p:nvSpPr>
+          <p:cNvPr id="5" name="Inhaltsplatzhalter 4"/>
+          <p:cNvSpPr>
+            <a:spLocks noGrp="1"/>
+          </p:cNvSpPr>
           <p:nvPr>
             <p:ph idx="1"/>
           </p:nvPr>
-        </p:nvPicPr>
-        <p:blipFill>
-          <a:blip r:embed="rId2" cstate="print"/>
-          <a:srcRect/>
-          <a:stretch>
-            <a:fillRect/>
-          </a:stretch>
-        </p:blipFill>
-        <p:spPr bwMode="auto">
-          <a:xfrm>
-            <a:off x="2043112" y="2824956"/>
-            <a:ext cx="5057775" cy="2076450"/>
-          </a:xfrm>
-          <a:prstGeom prst="rect">
-            <a:avLst/>
-          </a:prstGeom>
-          <a:noFill/>
-        </p:spPr>
-      </p:pic>
+        </p:nvSpPr>
+        <p:spPr/>
+        <p:txBody>
+          <a:bodyPr/>
+          <a:lstStyle/>
+          <a:p>
+            <a:r>
+              <a:rPr lang="de-DE" dirty="0" smtClean="0"/>
+              <a:t>„Kara“-Methode</a:t>
+            </a:r>
+          </a:p>
+          <a:p>
+            <a:r>
+              <a:rPr lang="de-DE" dirty="0" smtClean="0"/>
+              <a:t>„ZugSenden“ </a:t>
+            </a:r>
+            <a:r>
+              <a:rPr lang="de-DE" dirty="0" smtClean="0"/>
+              <a:t>für Fortgeschrittene</a:t>
+            </a:r>
+          </a:p>
+          <a:p>
+            <a:r>
+              <a:rPr lang="de-DE" dirty="0" smtClean="0"/>
+              <a:t>Viele Werkzeug-Funktionen</a:t>
+            </a:r>
+          </a:p>
+          <a:p>
+            <a:r>
+              <a:rPr lang="de-DE" dirty="0" smtClean="0"/>
+              <a:t>Methoden und Dokumentation auf Deutsch</a:t>
+            </a:r>
+          </a:p>
+          <a:p>
+            <a:r>
+              <a:rPr lang="de-DE" dirty="0" smtClean="0"/>
+              <a:t>Möglichst viel interne Logik entfernt</a:t>
+            </a:r>
+          </a:p>
+          <a:p>
+            <a:pPr lvl="1"/>
+            <a:r>
+              <a:rPr lang="de-DE" dirty="0" smtClean="0"/>
+              <a:t>Nur noch zwei Java-Dateien</a:t>
+            </a:r>
+          </a:p>
+        </p:txBody>
+      </p:sp>
     </p:spTree>
   </p:cSld>
   <p:clrMapOvr>
@@ -24063,14 +24296,12 @@
         </p:nvSpPr>
         <p:spPr/>
         <p:txBody>
-          <a:bodyPr>
-            <a:normAutofit/>
-          </a:bodyPr>
+          <a:bodyPr/>
           <a:lstStyle/>
           <a:p>
             <a:r>
               <a:rPr lang="de-DE" dirty="0" smtClean="0"/>
-              <a:t>Für Fortgeschrittene</a:t>
+              <a:t>„Kara“-Methode</a:t>
             </a:r>
             <a:endParaRPr lang="de-DE" dirty="0"/>
           </a:p>
@@ -24078,7 +24309,7 @@
       </p:sp>
       <p:pic>
         <p:nvPicPr>
-          <p:cNvPr id="10242" name="Picture 2" descr="C:\Users\Marcel\Documents\normal.png"/>
+          <p:cNvPr id="8194" name="Picture 2" descr="C:\Users\Marcel\Documents\kara.png"/>
           <p:cNvPicPr>
             <a:picLocks noGrp="1" noChangeAspect="1" noChangeArrowheads="1"/>
           </p:cNvPicPr>
@@ -24095,8 +24326,8 @@
         </p:blipFill>
         <p:spPr bwMode="auto">
           <a:xfrm>
-            <a:off x="2652712" y="3572669"/>
-            <a:ext cx="3838575" cy="581025"/>
+            <a:off x="2043112" y="2824956"/>
+            <a:ext cx="5057775" cy="2076450"/>
           </a:xfrm>
           <a:prstGeom prst="rect">
             <a:avLst/>
@@ -24141,6 +24372,84 @@
         </p:nvSpPr>
         <p:spPr/>
         <p:txBody>
+          <a:bodyPr>
+            <a:normAutofit/>
+          </a:bodyPr>
+          <a:lstStyle/>
+          <a:p>
+            <a:r>
+              <a:rPr lang="de-DE" dirty="0" smtClean="0"/>
+              <a:t>Für Fortgeschrittene</a:t>
+            </a:r>
+            <a:endParaRPr lang="de-DE" dirty="0"/>
+          </a:p>
+        </p:txBody>
+      </p:sp>
+      <p:pic>
+        <p:nvPicPr>
+          <p:cNvPr id="10242" name="Picture 2" descr="C:\Users\Marcel\Documents\normal.png"/>
+          <p:cNvPicPr>
+            <a:picLocks noGrp="1" noChangeAspect="1" noChangeArrowheads="1"/>
+          </p:cNvPicPr>
+          <p:nvPr>
+            <p:ph idx="1"/>
+          </p:nvPr>
+        </p:nvPicPr>
+        <p:blipFill>
+          <a:blip r:embed="rId2" cstate="print"/>
+          <a:srcRect/>
+          <a:stretch>
+            <a:fillRect/>
+          </a:stretch>
+        </p:blipFill>
+        <p:spPr bwMode="auto">
+          <a:xfrm>
+            <a:off x="2652712" y="3572669"/>
+            <a:ext cx="3838575" cy="581025"/>
+          </a:xfrm>
+          <a:prstGeom prst="rect">
+            <a:avLst/>
+          </a:prstGeom>
+          <a:noFill/>
+        </p:spPr>
+      </p:pic>
+    </p:spTree>
+  </p:cSld>
+  <p:clrMapOvr>
+    <a:masterClrMapping/>
+  </p:clrMapOvr>
+</p:sld>
+</file>
+
+<file path=ppt/slides/slide43.xml><?xml version="1.0" encoding="utf-8"?>
+<p:sld xmlns:a="http://schemas.openxmlformats.org/drawingml/2006/main" xmlns:r="http://schemas.openxmlformats.org/officeDocument/2006/relationships" xmlns:p="http://schemas.openxmlformats.org/presentationml/2006/main">
+  <p:cSld>
+    <p:spTree>
+      <p:nvGrpSpPr>
+        <p:cNvPr id="1" name=""/>
+        <p:cNvGrpSpPr/>
+        <p:nvPr/>
+      </p:nvGrpSpPr>
+      <p:grpSpPr>
+        <a:xfrm>
+          <a:off x="0" y="0"/>
+          <a:ext cx="0" cy="0"/>
+          <a:chOff x="0" y="0"/>
+          <a:chExt cx="0" cy="0"/>
+        </a:xfrm>
+      </p:grpSpPr>
+      <p:sp>
+        <p:nvSpPr>
+          <p:cNvPr id="2" name="Titel 1"/>
+          <p:cNvSpPr>
+            <a:spLocks noGrp="1"/>
+          </p:cNvSpPr>
+          <p:nvPr>
+            <p:ph type="title"/>
+          </p:nvPr>
+        </p:nvSpPr>
+        <p:spPr/>
+        <p:txBody>
           <a:bodyPr/>
           <a:lstStyle/>
           <a:p>
@@ -24183,7 +24492,7 @@
 </p:sld>
 </file>
 
-<file path=ppt/slides/slide43.xml><?xml version="1.0" encoding="utf-8"?>
+<file path=ppt/slides/slide44.xml><?xml version="1.0" encoding="utf-8"?>
 <p:sld xmlns:a="http://schemas.openxmlformats.org/drawingml/2006/main" xmlns:r="http://schemas.openxmlformats.org/officeDocument/2006/relationships" xmlns:p="http://schemas.openxmlformats.org/presentationml/2006/main">
   <p:cSld>
     <p:spTree>
@@ -24251,90 +24560,6 @@
           <a:noFill/>
         </p:spPr>
       </p:pic>
-    </p:spTree>
-  </p:cSld>
-  <p:clrMapOvr>
-    <a:masterClrMapping/>
-  </p:clrMapOvr>
-</p:sld>
-</file>
-
-<file path=ppt/slides/slide44.xml><?xml version="1.0" encoding="utf-8"?>
-<p:sld xmlns:a="http://schemas.openxmlformats.org/drawingml/2006/main" xmlns:r="http://schemas.openxmlformats.org/officeDocument/2006/relationships" xmlns:p="http://schemas.openxmlformats.org/presentationml/2006/main">
-  <p:cSld>
-    <p:spTree>
-      <p:nvGrpSpPr>
-        <p:cNvPr id="1" name=""/>
-        <p:cNvGrpSpPr/>
-        <p:nvPr/>
-      </p:nvGrpSpPr>
-      <p:grpSpPr>
-        <a:xfrm>
-          <a:off x="0" y="0"/>
-          <a:ext cx="0" cy="0"/>
-          <a:chOff x="0" y="0"/>
-          <a:chExt cx="0" cy="0"/>
-        </a:xfrm>
-      </p:grpSpPr>
-      <p:sp>
-        <p:nvSpPr>
-          <p:cNvPr id="6" name="Titel 5"/>
-          <p:cNvSpPr>
-            <a:spLocks noGrp="1"/>
-          </p:cNvSpPr>
-          <p:nvPr>
-            <p:ph type="title"/>
-          </p:nvPr>
-        </p:nvSpPr>
-        <p:spPr/>
-        <p:txBody>
-          <a:bodyPr/>
-          <a:lstStyle/>
-          <a:p>
-            <a:r>
-              <a:rPr lang="de-DE" dirty="0" smtClean="0"/>
-              <a:t>Was fehlt?</a:t>
-            </a:r>
-            <a:endParaRPr lang="de-DE" dirty="0"/>
-          </a:p>
-        </p:txBody>
-      </p:sp>
-      <p:sp>
-        <p:nvSpPr>
-          <p:cNvPr id="7" name="Inhaltsplatzhalter 6"/>
-          <p:cNvSpPr>
-            <a:spLocks noGrp="1"/>
-          </p:cNvSpPr>
-          <p:nvPr>
-            <p:ph idx="1"/>
-          </p:nvPr>
-        </p:nvSpPr>
-        <p:spPr/>
-        <p:txBody>
-          <a:bodyPr/>
-          <a:lstStyle/>
-          <a:p>
-            <a:r>
-              <a:rPr lang="de-DE" dirty="0" smtClean="0"/>
-              <a:t>Aufnahmen als GIF exportieren</a:t>
-            </a:r>
-          </a:p>
-          <a:p>
-            <a:pPr lvl="1"/>
-            <a:r>
-              <a:rPr lang="de-DE" dirty="0" smtClean="0"/>
-              <a:t>Alternative: Java-Applet auf Webseite</a:t>
-            </a:r>
-          </a:p>
-          <a:p>
-            <a:r>
-              <a:rPr lang="de-DE" dirty="0" smtClean="0"/>
-              <a:t>Automatische Wiedergabe von Aufnahmen</a:t>
-            </a:r>
-            <a:endParaRPr lang="de-DE" dirty="0"/>
-          </a:p>
-        </p:txBody>
-      </p:sp>
     </p:spTree>
   </p:cSld>
   <p:clrMapOvr>
@@ -24377,7 +24602,7 @@
           <a:p>
             <a:r>
               <a:rPr lang="de-DE" dirty="0" smtClean="0"/>
-              <a:t>Was könnte besser sein?</a:t>
+              <a:t>Was fehlt?</a:t>
             </a:r>
             <a:endParaRPr lang="de-DE" dirty="0"/>
           </a:p>
@@ -24400,83 +24625,22 @@
           <a:p>
             <a:r>
               <a:rPr lang="de-DE" dirty="0" smtClean="0"/>
-              <a:t>Framework für GUI </a:t>
-            </a:r>
-            <a:r>
-              <a:rPr lang="de-DE" dirty="0" err="1" smtClean="0"/>
-              <a:t>Plugins</a:t>
-            </a:r>
+              <a:t>Aufnahmen als GIF exportieren</a:t>
+            </a:r>
+          </a:p>
+          <a:p>
+            <a:pPr lvl="1"/>
             <a:r>
               <a:rPr lang="de-DE" dirty="0" smtClean="0"/>
-              <a:t> anbieten</a:t>
-            </a:r>
-          </a:p>
-          <a:p>
-            <a:pPr lvl="1"/>
+              <a:t>Alternative: Java-Applet auf Webseite</a:t>
+            </a:r>
+          </a:p>
+          <a:p>
             <a:r>
               <a:rPr lang="de-DE" dirty="0" smtClean="0"/>
-              <a:t>Alternative: Template-Generierung</a:t>
-            </a:r>
-          </a:p>
-          <a:p>
-            <a:r>
-              <a:rPr lang="de-DE" dirty="0" smtClean="0"/>
-              <a:t>Entzerrung des </a:t>
-            </a:r>
-            <a:r>
-              <a:rPr lang="de-DE" dirty="0" err="1" smtClean="0"/>
-              <a:t>Plugins</a:t>
-            </a:r>
-            <a:endParaRPr lang="de-DE" dirty="0" smtClean="0"/>
-          </a:p>
-          <a:p>
-            <a:pPr lvl="1"/>
-            <a:r>
-              <a:rPr lang="de-DE" dirty="0" smtClean="0"/>
-              <a:t>Server, </a:t>
-            </a:r>
-            <a:r>
-              <a:rPr lang="de-DE" dirty="0" err="1" smtClean="0"/>
-              <a:t>Shared</a:t>
-            </a:r>
-            <a:r>
-              <a:rPr lang="de-DE" smtClean="0"/>
-              <a:t>, GUI</a:t>
-            </a:r>
-            <a:endParaRPr lang="de-DE" dirty="0" smtClean="0"/>
-          </a:p>
-          <a:p>
-            <a:r>
-              <a:rPr lang="de-DE" dirty="0" smtClean="0"/>
-              <a:t>3D-Darstellung</a:t>
-            </a:r>
-          </a:p>
-          <a:p>
-            <a:r>
-              <a:rPr lang="de-DE" dirty="0" smtClean="0"/>
-              <a:t>Einfaches Beispiel</a:t>
-            </a:r>
-          </a:p>
-          <a:p>
-            <a:pPr lvl="1"/>
-            <a:r>
-              <a:rPr lang="de-DE" dirty="0" smtClean="0"/>
-              <a:t>Erste Fassung: „</a:t>
-            </a:r>
-            <a:r>
-              <a:rPr lang="de-DE" dirty="0" err="1" smtClean="0"/>
-              <a:t>TicTacToe</a:t>
-            </a:r>
-            <a:r>
-              <a:rPr lang="de-DE" dirty="0" smtClean="0"/>
-              <a:t>“ (nur Logik)</a:t>
-            </a:r>
-          </a:p>
-          <a:p>
-            <a:pPr>
-              <a:buNone/>
-            </a:pPr>
-            <a:endParaRPr lang="de-DE" dirty="0" smtClean="0"/>
+              <a:t>Automatische Wiedergabe von Aufnahmen</a:t>
+            </a:r>
+            <a:endParaRPr lang="de-DE" dirty="0"/>
           </a:p>
         </p:txBody>
       </p:sp>
@@ -24489,6 +24653,151 @@
 </file>
 
 <file path=ppt/slides/slide46.xml><?xml version="1.0" encoding="utf-8"?>
+<p:sld xmlns:a="http://schemas.openxmlformats.org/drawingml/2006/main" xmlns:r="http://schemas.openxmlformats.org/officeDocument/2006/relationships" xmlns:p="http://schemas.openxmlformats.org/presentationml/2006/main">
+  <p:cSld>
+    <p:spTree>
+      <p:nvGrpSpPr>
+        <p:cNvPr id="1" name=""/>
+        <p:cNvGrpSpPr/>
+        <p:nvPr/>
+      </p:nvGrpSpPr>
+      <p:grpSpPr>
+        <a:xfrm>
+          <a:off x="0" y="0"/>
+          <a:ext cx="0" cy="0"/>
+          <a:chOff x="0" y="0"/>
+          <a:chExt cx="0" cy="0"/>
+        </a:xfrm>
+      </p:grpSpPr>
+      <p:sp>
+        <p:nvSpPr>
+          <p:cNvPr id="6" name="Titel 5"/>
+          <p:cNvSpPr>
+            <a:spLocks noGrp="1"/>
+          </p:cNvSpPr>
+          <p:nvPr>
+            <p:ph type="title"/>
+          </p:nvPr>
+        </p:nvSpPr>
+        <p:spPr/>
+        <p:txBody>
+          <a:bodyPr/>
+          <a:lstStyle/>
+          <a:p>
+            <a:r>
+              <a:rPr lang="de-DE" dirty="0" smtClean="0"/>
+              <a:t>Was könnte besser sein?</a:t>
+            </a:r>
+            <a:endParaRPr lang="de-DE" dirty="0"/>
+          </a:p>
+        </p:txBody>
+      </p:sp>
+      <p:sp>
+        <p:nvSpPr>
+          <p:cNvPr id="7" name="Inhaltsplatzhalter 6"/>
+          <p:cNvSpPr>
+            <a:spLocks noGrp="1"/>
+          </p:cNvSpPr>
+          <p:nvPr>
+            <p:ph idx="1"/>
+          </p:nvPr>
+        </p:nvSpPr>
+        <p:spPr/>
+        <p:txBody>
+          <a:bodyPr/>
+          <a:lstStyle/>
+          <a:p>
+            <a:r>
+              <a:rPr lang="de-DE" dirty="0" smtClean="0"/>
+              <a:t>Framework für GUI </a:t>
+            </a:r>
+            <a:r>
+              <a:rPr lang="de-DE" dirty="0" err="1" smtClean="0"/>
+              <a:t>Plugins</a:t>
+            </a:r>
+            <a:r>
+              <a:rPr lang="de-DE" dirty="0" smtClean="0"/>
+              <a:t> anbieten</a:t>
+            </a:r>
+          </a:p>
+          <a:p>
+            <a:pPr lvl="1"/>
+            <a:r>
+              <a:rPr lang="de-DE" dirty="0" smtClean="0"/>
+              <a:t>Alternative: Template-Generierung</a:t>
+            </a:r>
+          </a:p>
+          <a:p>
+            <a:r>
+              <a:rPr lang="de-DE" dirty="0" smtClean="0"/>
+              <a:t>Entzerrung des </a:t>
+            </a:r>
+            <a:r>
+              <a:rPr lang="de-DE" dirty="0" err="1" smtClean="0"/>
+              <a:t>Plugins</a:t>
+            </a:r>
+            <a:endParaRPr lang="de-DE" dirty="0" smtClean="0"/>
+          </a:p>
+          <a:p>
+            <a:pPr lvl="1"/>
+            <a:r>
+              <a:rPr lang="de-DE" dirty="0" smtClean="0"/>
+              <a:t>Server, </a:t>
+            </a:r>
+            <a:r>
+              <a:rPr lang="de-DE" dirty="0" err="1" smtClean="0"/>
+              <a:t>Shared</a:t>
+            </a:r>
+            <a:r>
+              <a:rPr lang="de-DE" smtClean="0"/>
+              <a:t>, GUI</a:t>
+            </a:r>
+            <a:endParaRPr lang="de-DE" dirty="0" smtClean="0"/>
+          </a:p>
+          <a:p>
+            <a:r>
+              <a:rPr lang="de-DE" dirty="0" smtClean="0"/>
+              <a:t>3D-Darstellung</a:t>
+            </a:r>
+          </a:p>
+          <a:p>
+            <a:r>
+              <a:rPr lang="de-DE" dirty="0" smtClean="0"/>
+              <a:t>Einfaches Beispiel</a:t>
+            </a:r>
+          </a:p>
+          <a:p>
+            <a:pPr lvl="1"/>
+            <a:r>
+              <a:rPr lang="de-DE" dirty="0" smtClean="0"/>
+              <a:t>Erste Fassung: „</a:t>
+            </a:r>
+            <a:r>
+              <a:rPr lang="de-DE" dirty="0" err="1" smtClean="0"/>
+              <a:t>TicTacToe</a:t>
+            </a:r>
+            <a:r>
+              <a:rPr lang="de-DE" dirty="0" smtClean="0"/>
+              <a:t>“ (nur Logik)</a:t>
+            </a:r>
+          </a:p>
+          <a:p>
+            <a:pPr>
+              <a:buNone/>
+            </a:pPr>
+            <a:endParaRPr lang="de-DE" dirty="0" smtClean="0"/>
+          </a:p>
+        </p:txBody>
+      </p:sp>
+    </p:spTree>
+  </p:cSld>
+  <p:clrMapOvr>
+    <a:masterClrMapping/>
+  </p:clrMapOvr>
+</p:sld>
+</file>
+
+<file path=ppt/slides/slide47.xml><?xml version="1.0" encoding="utf-8"?>
 <p:sld xmlns:a="http://schemas.openxmlformats.org/drawingml/2006/main" xmlns:r="http://schemas.openxmlformats.org/officeDocument/2006/relationships" xmlns:p="http://schemas.openxmlformats.org/presentationml/2006/main" show="0">
   <p:cSld>
     <p:spTree>
@@ -24579,7 +24888,7 @@
 </p:sld>
 </file>
 
-<file path=ppt/slides/slide47.xml><?xml version="1.0" encoding="utf-8"?>
+<file path=ppt/slides/slide48.xml><?xml version="1.0" encoding="utf-8"?>
 <p:sld xmlns:a="http://schemas.openxmlformats.org/drawingml/2006/main" xmlns:r="http://schemas.openxmlformats.org/officeDocument/2006/relationships" xmlns:p="http://schemas.openxmlformats.org/presentationml/2006/main">
   <p:cSld>
     <p:spTree>
@@ -24642,74 +24951,6 @@
           </a:p>
         </p:txBody>
       </p:sp>
-    </p:spTree>
-  </p:cSld>
-  <p:clrMapOvr>
-    <a:masterClrMapping/>
-  </p:clrMapOvr>
-</p:sld>
-</file>
-
-<file path=ppt/slides/slide48.xml><?xml version="1.0" encoding="utf-8"?>
-<p:sld xmlns:a="http://schemas.openxmlformats.org/drawingml/2006/main" xmlns:r="http://schemas.openxmlformats.org/officeDocument/2006/relationships" xmlns:p="http://schemas.openxmlformats.org/presentationml/2006/main">
-  <p:cSld>
-    <p:spTree>
-      <p:nvGrpSpPr>
-        <p:cNvPr id="1" name=""/>
-        <p:cNvGrpSpPr/>
-        <p:nvPr/>
-      </p:nvGrpSpPr>
-      <p:grpSpPr>
-        <a:xfrm>
-          <a:off x="0" y="0"/>
-          <a:ext cx="0" cy="0"/>
-          <a:chOff x="0" y="0"/>
-          <a:chExt cx="0" cy="0"/>
-        </a:xfrm>
-      </p:grpSpPr>
-      <p:sp>
-        <p:nvSpPr>
-          <p:cNvPr id="4" name="Titel 3"/>
-          <p:cNvSpPr>
-            <a:spLocks noGrp="1"/>
-          </p:cNvSpPr>
-          <p:nvPr>
-            <p:ph type="title"/>
-          </p:nvPr>
-        </p:nvSpPr>
-        <p:spPr/>
-        <p:txBody>
-          <a:bodyPr/>
-          <a:lstStyle/>
-          <a:p>
-            <a:r>
-              <a:rPr lang="de-DE" dirty="0" smtClean="0"/>
-              <a:t>Die nächsten Schritte</a:t>
-            </a:r>
-            <a:endParaRPr lang="de-DE" dirty="0"/>
-          </a:p>
-        </p:txBody>
-      </p:sp>
-      <p:graphicFrame>
-        <p:nvGraphicFramePr>
-          <p:cNvPr id="6" name="Inhaltsplatzhalter 5"/>
-          <p:cNvGraphicFramePr>
-            <a:graphicFrameLocks noGrp="1"/>
-          </p:cNvGraphicFramePr>
-          <p:nvPr>
-            <p:ph idx="1"/>
-          </p:nvPr>
-        </p:nvGraphicFramePr>
-        <p:xfrm>
-          <a:off x="457200" y="1600200"/>
-          <a:ext cx="8229600" cy="4525963"/>
-        </p:xfrm>
-        <a:graphic>
-          <a:graphicData uri="http://schemas.openxmlformats.org/drawingml/2006/diagram">
-            <dgm:relIds xmlns:dgm="http://schemas.openxmlformats.org/drawingml/2006/diagram" xmlns:r="http://schemas.openxmlformats.org/officeDocument/2006/relationships" r:dm="rId2" r:lo="rId3" r:qs="rId4" r:cs="rId5"/>
-          </a:graphicData>
-        </a:graphic>
-      </p:graphicFrame>
     </p:spTree>
   </p:cSld>
   <p:clrMapOvr>
@@ -24752,40 +24993,32 @@
           <a:p>
             <a:r>
               <a:rPr lang="de-DE" dirty="0" smtClean="0"/>
-              <a:t>Zeitplan</a:t>
+              <a:t>Die nächsten Schritte</a:t>
             </a:r>
             <a:endParaRPr lang="de-DE" dirty="0"/>
           </a:p>
         </p:txBody>
       </p:sp>
-      <p:pic>
-        <p:nvPicPr>
-          <p:cNvPr id="4098" name="Picture 2" descr="C:\Users\Marcel\Desktop\SC-Website-Zeitplan.png"/>
-          <p:cNvPicPr>
-            <a:picLocks noGrp="1" noChangeAspect="1" noChangeArrowheads="1"/>
-          </p:cNvPicPr>
+      <p:graphicFrame>
+        <p:nvGraphicFramePr>
+          <p:cNvPr id="6" name="Inhaltsplatzhalter 5"/>
+          <p:cNvGraphicFramePr>
+            <a:graphicFrameLocks noGrp="1"/>
+          </p:cNvGraphicFramePr>
           <p:nvPr>
             <p:ph idx="1"/>
           </p:nvPr>
-        </p:nvPicPr>
-        <p:blipFill>
-          <a:blip r:embed="rId2" cstate="print"/>
-          <a:srcRect/>
-          <a:stretch>
-            <a:fillRect/>
-          </a:stretch>
-        </p:blipFill>
-        <p:spPr bwMode="auto">
-          <a:xfrm>
-            <a:off x="457200" y="2892647"/>
-            <a:ext cx="8229600" cy="1941069"/>
-          </a:xfrm>
-          <a:prstGeom prst="rect">
-            <a:avLst/>
-          </a:prstGeom>
-          <a:noFill/>
-        </p:spPr>
-      </p:pic>
+        </p:nvGraphicFramePr>
+        <p:xfrm>
+          <a:off x="457200" y="1600200"/>
+          <a:ext cx="8229600" cy="4525963"/>
+        </p:xfrm>
+        <a:graphic>
+          <a:graphicData uri="http://schemas.openxmlformats.org/drawingml/2006/diagram">
+            <dgm:relIds xmlns:dgm="http://schemas.openxmlformats.org/drawingml/2006/diagram" xmlns:r="http://schemas.openxmlformats.org/officeDocument/2006/relationships" r:dm="rId2" r:lo="rId3" r:qs="rId4" r:cs="rId5"/>
+          </a:graphicData>
+        </a:graphic>
+      </p:graphicFrame>
     </p:spTree>
   </p:cSld>
   <p:clrMapOvr>
@@ -24905,6 +25138,82 @@
 </file>
 
 <file path=ppt/slides/slide50.xml><?xml version="1.0" encoding="utf-8"?>
+<p:sld xmlns:a="http://schemas.openxmlformats.org/drawingml/2006/main" xmlns:r="http://schemas.openxmlformats.org/officeDocument/2006/relationships" xmlns:p="http://schemas.openxmlformats.org/presentationml/2006/main">
+  <p:cSld>
+    <p:spTree>
+      <p:nvGrpSpPr>
+        <p:cNvPr id="1" name=""/>
+        <p:cNvGrpSpPr/>
+        <p:nvPr/>
+      </p:nvGrpSpPr>
+      <p:grpSpPr>
+        <a:xfrm>
+          <a:off x="0" y="0"/>
+          <a:ext cx="0" cy="0"/>
+          <a:chOff x="0" y="0"/>
+          <a:chExt cx="0" cy="0"/>
+        </a:xfrm>
+      </p:grpSpPr>
+      <p:sp>
+        <p:nvSpPr>
+          <p:cNvPr id="4" name="Titel 3"/>
+          <p:cNvSpPr>
+            <a:spLocks noGrp="1"/>
+          </p:cNvSpPr>
+          <p:nvPr>
+            <p:ph type="title"/>
+          </p:nvPr>
+        </p:nvSpPr>
+        <p:spPr/>
+        <p:txBody>
+          <a:bodyPr/>
+          <a:lstStyle/>
+          <a:p>
+            <a:r>
+              <a:rPr lang="de-DE" dirty="0" smtClean="0"/>
+              <a:t>Zeitplan</a:t>
+            </a:r>
+            <a:endParaRPr lang="de-DE" dirty="0"/>
+          </a:p>
+        </p:txBody>
+      </p:sp>
+      <p:pic>
+        <p:nvPicPr>
+          <p:cNvPr id="4098" name="Picture 2" descr="C:\Users\Marcel\Desktop\SC-Website-Zeitplan.png"/>
+          <p:cNvPicPr>
+            <a:picLocks noGrp="1" noChangeAspect="1" noChangeArrowheads="1"/>
+          </p:cNvPicPr>
+          <p:nvPr>
+            <p:ph idx="1"/>
+          </p:nvPr>
+        </p:nvPicPr>
+        <p:blipFill>
+          <a:blip r:embed="rId2" cstate="print"/>
+          <a:srcRect/>
+          <a:stretch>
+            <a:fillRect/>
+          </a:stretch>
+        </p:blipFill>
+        <p:spPr bwMode="auto">
+          <a:xfrm>
+            <a:off x="457200" y="2892647"/>
+            <a:ext cx="8229600" cy="1941069"/>
+          </a:xfrm>
+          <a:prstGeom prst="rect">
+            <a:avLst/>
+          </a:prstGeom>
+          <a:noFill/>
+        </p:spPr>
+      </p:pic>
+    </p:spTree>
+  </p:cSld>
+  <p:clrMapOvr>
+    <a:masterClrMapping/>
+  </p:clrMapOvr>
+</p:sld>
+</file>
+
+<file path=ppt/slides/slide51.xml><?xml version="1.0" encoding="utf-8"?>
 <p:sld xmlns:a="http://schemas.openxmlformats.org/drawingml/2006/main" xmlns:r="http://schemas.openxmlformats.org/officeDocument/2006/relationships" xmlns:p="http://schemas.openxmlformats.org/presentationml/2006/main">
   <p:cSld>
     <p:spTree>
@@ -25793,8 +26102,9 @@
           <a:p>
             <a:r>
               <a:rPr lang="de-DE" dirty="0" smtClean="0"/>
-              <a:t>Aufnahme betrachten</a:t>
-            </a:r>
+              <a:t>Mitschnitt betrachten</a:t>
+            </a:r>
+            <a:endParaRPr lang="de-DE" dirty="0" smtClean="0"/>
           </a:p>
           <a:p>
             <a:r>

</xml_diff>